<commit_message>
OHBM posters updates and news
</commit_message>
<xml_diff>
--- a/BBSC_HBM.pptx
+++ b/BBSC_HBM.pptx
@@ -63,7 +63,7 @@
         <p:txBody>
           <a:bodyPr/>
           <a:p>
-            <a:fld id="{C0D780A0-D70D-48DC-9112-9DCD1312CB16}" type="slidenum">
+            <a:fld id="{EF96F10A-B162-497A-A4E4-06231F7E90A5}" type="slidenum">
               <a:t>&lt;#&gt;</a:t>
             </a:fld>
           </a:p>
@@ -125,7 +125,7 @@
         <p:spPr>
           <a:xfrm>
             <a:off x="2400120" y="6734160"/>
-            <a:ext cx="27202680" cy="14325120"/>
+            <a:ext cx="27202320" cy="14324760"/>
           </a:xfrm>
           <a:prstGeom prst="rect">
             <a:avLst/>
@@ -162,7 +162,7 @@
         <p:spPr>
           <a:xfrm>
             <a:off x="1600200" y="9628560"/>
-            <a:ext cx="28803240" cy="11383560"/>
+            <a:ext cx="28802880" cy="11383560"/>
           </a:xfrm>
           <a:prstGeom prst="rect">
             <a:avLst/>
@@ -196,7 +196,7 @@
         <p:spPr>
           <a:xfrm>
             <a:off x="1600200" y="22093920"/>
-            <a:ext cx="28803240" cy="11383560"/>
+            <a:ext cx="28802880" cy="11383560"/>
           </a:xfrm>
           <a:prstGeom prst="rect">
             <a:avLst/>
@@ -251,7 +251,7 @@
         <p:txBody>
           <a:bodyPr/>
           <a:p>
-            <a:fld id="{B6B8C5CC-DAD6-4742-80D2-23F19BD5C073}" type="slidenum">
+            <a:fld id="{645EE831-806C-45BB-A9EC-D60C9738D3B1}" type="slidenum">
               <a:t>&lt;#&gt;</a:t>
             </a:fld>
           </a:p>
@@ -313,7 +313,7 @@
         <p:spPr>
           <a:xfrm>
             <a:off x="2400120" y="6734160"/>
-            <a:ext cx="27202680" cy="14325120"/>
+            <a:ext cx="27202320" cy="14324760"/>
           </a:xfrm>
           <a:prstGeom prst="rect">
             <a:avLst/>
@@ -350,7 +350,7 @@
         <p:spPr>
           <a:xfrm>
             <a:off x="1600200" y="9628560"/>
-            <a:ext cx="14055840" cy="11383560"/>
+            <a:ext cx="14055480" cy="11383560"/>
           </a:xfrm>
           <a:prstGeom prst="rect">
             <a:avLst/>
@@ -383,8 +383,8 @@
         </p:nvSpPr>
         <p:spPr>
           <a:xfrm>
-            <a:off x="16359120" y="9628560"/>
-            <a:ext cx="14055840" cy="11383560"/>
+            <a:off x="16358760" y="9628560"/>
+            <a:ext cx="14055480" cy="11383560"/>
           </a:xfrm>
           <a:prstGeom prst="rect">
             <a:avLst/>
@@ -418,7 +418,7 @@
         <p:spPr>
           <a:xfrm>
             <a:off x="1600200" y="22093920"/>
-            <a:ext cx="14055840" cy="11383560"/>
+            <a:ext cx="14055480" cy="11383560"/>
           </a:xfrm>
           <a:prstGeom prst="rect">
             <a:avLst/>
@@ -451,8 +451,8 @@
         </p:nvSpPr>
         <p:spPr>
           <a:xfrm>
-            <a:off x="16359120" y="22093920"/>
-            <a:ext cx="14055840" cy="11383560"/>
+            <a:off x="16358760" y="22093920"/>
+            <a:ext cx="14055480" cy="11383560"/>
           </a:xfrm>
           <a:prstGeom prst="rect">
             <a:avLst/>
@@ -507,7 +507,7 @@
         <p:txBody>
           <a:bodyPr/>
           <a:p>
-            <a:fld id="{218A24D2-30F0-454B-9CE6-D010EDF7EE88}" type="slidenum">
+            <a:fld id="{C472EAD6-B0B4-49E9-A7BD-9D6E260FC3B9}" type="slidenum">
               <a:t>&lt;#&gt;</a:t>
             </a:fld>
           </a:p>
@@ -569,7 +569,7 @@
         <p:spPr>
           <a:xfrm>
             <a:off x="2400120" y="6734160"/>
-            <a:ext cx="27202680" cy="14325120"/>
+            <a:ext cx="27202320" cy="14324760"/>
           </a:xfrm>
           <a:prstGeom prst="rect">
             <a:avLst/>
@@ -831,7 +831,7 @@
         <p:txBody>
           <a:bodyPr/>
           <a:p>
-            <a:fld id="{EBAE0312-BAC5-43AF-A4C3-31D725295A0B}" type="slidenum">
+            <a:fld id="{11098695-EAC3-4DF1-A4F8-4A134F16627C}" type="slidenum">
               <a:t>&lt;#&gt;</a:t>
             </a:fld>
           </a:p>
@@ -893,7 +893,7 @@
         <p:spPr>
           <a:xfrm>
             <a:off x="2400120" y="6734160"/>
-            <a:ext cx="27202680" cy="14325120"/>
+            <a:ext cx="27202320" cy="14324760"/>
           </a:xfrm>
           <a:prstGeom prst="rect">
             <a:avLst/>
@@ -930,7 +930,7 @@
         <p:spPr>
           <a:xfrm>
             <a:off x="1600200" y="9628560"/>
-            <a:ext cx="28803240" cy="23865480"/>
+            <a:ext cx="28802880" cy="23865120"/>
           </a:xfrm>
           <a:prstGeom prst="rect">
             <a:avLst/>
@@ -988,7 +988,7 @@
         <p:txBody>
           <a:bodyPr/>
           <a:p>
-            <a:fld id="{F957D552-7A2A-4AAF-9315-0F4A19A6FC66}" type="slidenum">
+            <a:fld id="{0CAFBF6A-5D1D-4B0D-9DD4-8ED8548CF5C5}" type="slidenum">
               <a:t>&lt;#&gt;</a:t>
             </a:fld>
           </a:p>
@@ -1050,7 +1050,7 @@
         <p:spPr>
           <a:xfrm>
             <a:off x="2400120" y="6734160"/>
-            <a:ext cx="27202680" cy="14325120"/>
+            <a:ext cx="27202320" cy="14324760"/>
           </a:xfrm>
           <a:prstGeom prst="rect">
             <a:avLst/>
@@ -1087,7 +1087,7 @@
         <p:spPr>
           <a:xfrm>
             <a:off x="1600200" y="9628560"/>
-            <a:ext cx="28803240" cy="23865480"/>
+            <a:ext cx="28802880" cy="23865120"/>
           </a:xfrm>
           <a:prstGeom prst="rect">
             <a:avLst/>
@@ -1142,7 +1142,7 @@
         <p:txBody>
           <a:bodyPr/>
           <a:p>
-            <a:fld id="{E3FC0B86-D813-45C4-B635-7BC9A600FC44}" type="slidenum">
+            <a:fld id="{F001FFBD-1B35-4967-BA83-A15ED5853124}" type="slidenum">
               <a:t>&lt;#&gt;</a:t>
             </a:fld>
           </a:p>
@@ -1204,7 +1204,7 @@
         <p:spPr>
           <a:xfrm>
             <a:off x="2400120" y="6734160"/>
-            <a:ext cx="27202680" cy="14325120"/>
+            <a:ext cx="27202320" cy="14324760"/>
           </a:xfrm>
           <a:prstGeom prst="rect">
             <a:avLst/>
@@ -1241,7 +1241,7 @@
         <p:spPr>
           <a:xfrm>
             <a:off x="1600200" y="9628560"/>
-            <a:ext cx="14055840" cy="23865480"/>
+            <a:ext cx="14055480" cy="23865120"/>
           </a:xfrm>
           <a:prstGeom prst="rect">
             <a:avLst/>
@@ -1274,8 +1274,8 @@
         </p:nvSpPr>
         <p:spPr>
           <a:xfrm>
-            <a:off x="16359120" y="9628560"/>
-            <a:ext cx="14055840" cy="23865480"/>
+            <a:off x="16358760" y="9628560"/>
+            <a:ext cx="14055480" cy="23865120"/>
           </a:xfrm>
           <a:prstGeom prst="rect">
             <a:avLst/>
@@ -1330,7 +1330,7 @@
         <p:txBody>
           <a:bodyPr/>
           <a:p>
-            <a:fld id="{2ACC544C-BFBE-4A65-AABD-AC6112312CD9}" type="slidenum">
+            <a:fld id="{3ECCA0B2-B23B-4F83-9C25-4E79C0AA9BA9}" type="slidenum">
               <a:t>&lt;#&gt;</a:t>
             </a:fld>
           </a:p>
@@ -1392,7 +1392,7 @@
         <p:spPr>
           <a:xfrm>
             <a:off x="2400120" y="6734160"/>
-            <a:ext cx="27202680" cy="14325120"/>
+            <a:ext cx="27202320" cy="14324760"/>
           </a:xfrm>
           <a:prstGeom prst="rect">
             <a:avLst/>
@@ -1450,7 +1450,7 @@
         <p:txBody>
           <a:bodyPr/>
           <a:p>
-            <a:fld id="{E715335A-042B-4F1A-A0BC-62099091F8D1}" type="slidenum">
+            <a:fld id="{8AA483A7-5E20-43C8-A1AC-4F9240F8092A}" type="slidenum">
               <a:t>&lt;#&gt;</a:t>
             </a:fld>
           </a:p>
@@ -1512,7 +1512,7 @@
         <p:spPr>
           <a:xfrm>
             <a:off x="2400120" y="6734160"/>
-            <a:ext cx="27202680" cy="66403800"/>
+            <a:ext cx="27202320" cy="66402360"/>
           </a:xfrm>
           <a:prstGeom prst="rect">
             <a:avLst/>
@@ -1570,7 +1570,7 @@
         <p:txBody>
           <a:bodyPr/>
           <a:p>
-            <a:fld id="{EC8B703F-E1FF-49C4-92B5-521D9542BA04}" type="slidenum">
+            <a:fld id="{692AA418-78A0-4090-9684-41DF5C2A8C9A}" type="slidenum">
               <a:t>&lt;#&gt;</a:t>
             </a:fld>
           </a:p>
@@ -1632,7 +1632,7 @@
         <p:spPr>
           <a:xfrm>
             <a:off x="2400120" y="6734160"/>
-            <a:ext cx="27202680" cy="14325120"/>
+            <a:ext cx="27202320" cy="14324760"/>
           </a:xfrm>
           <a:prstGeom prst="rect">
             <a:avLst/>
@@ -1669,7 +1669,7 @@
         <p:spPr>
           <a:xfrm>
             <a:off x="1600200" y="9628560"/>
-            <a:ext cx="14055840" cy="11383560"/>
+            <a:ext cx="14055480" cy="11383560"/>
           </a:xfrm>
           <a:prstGeom prst="rect">
             <a:avLst/>
@@ -1702,8 +1702,8 @@
         </p:nvSpPr>
         <p:spPr>
           <a:xfrm>
-            <a:off x="16359120" y="9628560"/>
-            <a:ext cx="14055840" cy="23865480"/>
+            <a:off x="16358760" y="9628560"/>
+            <a:ext cx="14055480" cy="23865120"/>
           </a:xfrm>
           <a:prstGeom prst="rect">
             <a:avLst/>
@@ -1737,7 +1737,7 @@
         <p:spPr>
           <a:xfrm>
             <a:off x="1600200" y="22093920"/>
-            <a:ext cx="14055840" cy="11383560"/>
+            <a:ext cx="14055480" cy="11383560"/>
           </a:xfrm>
           <a:prstGeom prst="rect">
             <a:avLst/>
@@ -1792,7 +1792,7 @@
         <p:txBody>
           <a:bodyPr/>
           <a:p>
-            <a:fld id="{C813C6A3-8F7E-4562-A25F-226109CC2936}" type="slidenum">
+            <a:fld id="{46205C55-8625-4F82-A963-3847EC34BA0D}" type="slidenum">
               <a:t>&lt;#&gt;</a:t>
             </a:fld>
           </a:p>
@@ -1854,7 +1854,7 @@
         <p:spPr>
           <a:xfrm>
             <a:off x="2400120" y="6734160"/>
-            <a:ext cx="27202680" cy="14325120"/>
+            <a:ext cx="27202320" cy="14324760"/>
           </a:xfrm>
           <a:prstGeom prst="rect">
             <a:avLst/>
@@ -1891,7 +1891,7 @@
         <p:spPr>
           <a:xfrm>
             <a:off x="1600200" y="9628560"/>
-            <a:ext cx="14055840" cy="23865480"/>
+            <a:ext cx="14055480" cy="23865120"/>
           </a:xfrm>
           <a:prstGeom prst="rect">
             <a:avLst/>
@@ -1924,8 +1924,8 @@
         </p:nvSpPr>
         <p:spPr>
           <a:xfrm>
-            <a:off x="16359120" y="9628560"/>
-            <a:ext cx="14055840" cy="11383560"/>
+            <a:off x="16358760" y="9628560"/>
+            <a:ext cx="14055480" cy="11383560"/>
           </a:xfrm>
           <a:prstGeom prst="rect">
             <a:avLst/>
@@ -1958,8 +1958,8 @@
         </p:nvSpPr>
         <p:spPr>
           <a:xfrm>
-            <a:off x="16359120" y="22093920"/>
-            <a:ext cx="14055840" cy="11383560"/>
+            <a:off x="16358760" y="22093920"/>
+            <a:ext cx="14055480" cy="11383560"/>
           </a:xfrm>
           <a:prstGeom prst="rect">
             <a:avLst/>
@@ -2014,7 +2014,7 @@
         <p:txBody>
           <a:bodyPr/>
           <a:p>
-            <a:fld id="{1105CDFD-8F1B-4692-9FA0-828F976D0BD5}" type="slidenum">
+            <a:fld id="{8EDFF8AA-DB48-4BD0-9F1D-0380239202D9}" type="slidenum">
               <a:t>&lt;#&gt;</a:t>
             </a:fld>
           </a:p>
@@ -2076,7 +2076,7 @@
         <p:spPr>
           <a:xfrm>
             <a:off x="2400120" y="6734160"/>
-            <a:ext cx="27202680" cy="14325120"/>
+            <a:ext cx="27202320" cy="14324760"/>
           </a:xfrm>
           <a:prstGeom prst="rect">
             <a:avLst/>
@@ -2113,7 +2113,7 @@
         <p:spPr>
           <a:xfrm>
             <a:off x="1600200" y="9628560"/>
-            <a:ext cx="14055840" cy="11383560"/>
+            <a:ext cx="14055480" cy="11383560"/>
           </a:xfrm>
           <a:prstGeom prst="rect">
             <a:avLst/>
@@ -2146,8 +2146,8 @@
         </p:nvSpPr>
         <p:spPr>
           <a:xfrm>
-            <a:off x="16359120" y="9628560"/>
-            <a:ext cx="14055840" cy="11383560"/>
+            <a:off x="16358760" y="9628560"/>
+            <a:ext cx="14055480" cy="11383560"/>
           </a:xfrm>
           <a:prstGeom prst="rect">
             <a:avLst/>
@@ -2181,7 +2181,7 @@
         <p:spPr>
           <a:xfrm>
             <a:off x="1600200" y="22093920"/>
-            <a:ext cx="28803240" cy="11383560"/>
+            <a:ext cx="28802880" cy="11383560"/>
           </a:xfrm>
           <a:prstGeom prst="rect">
             <a:avLst/>
@@ -2236,7 +2236,7 @@
         <p:txBody>
           <a:bodyPr/>
           <a:p>
-            <a:fld id="{B79E8F29-7FA2-4C64-8883-DAE18049655A}" type="slidenum">
+            <a:fld id="{1AA06A7D-516C-4214-ABB7-54690B527DC5}" type="slidenum">
               <a:t>&lt;#&gt;</a:t>
             </a:fld>
           </a:p>
@@ -2305,7 +2305,7 @@
         <p:spPr>
           <a:xfrm>
             <a:off x="2400120" y="6734160"/>
-            <a:ext cx="27202680" cy="14325120"/>
+            <a:ext cx="27202320" cy="14324760"/>
           </a:xfrm>
           <a:prstGeom prst="rect">
             <a:avLst/>
@@ -2339,13 +2339,196 @@
             <a:spLocks noGrp="1"/>
           </p:cNvSpPr>
           <p:nvPr>
+            <p:ph type="body"/>
+          </p:nvPr>
+        </p:nvSpPr>
+        <p:spPr>
+          <a:xfrm>
+            <a:off x="1600200" y="9628560"/>
+            <a:ext cx="28802880" cy="23865120"/>
+          </a:xfrm>
+          <a:prstGeom prst="rect">
+            <a:avLst/>
+          </a:prstGeom>
+          <a:noFill/>
+          <a:ln w="0">
+            <a:noFill/>
+          </a:ln>
+        </p:spPr>
+        <p:txBody>
+          <a:bodyPr lIns="0" rIns="0" tIns="0" bIns="0" anchor="t">
+            <a:normAutofit/>
+          </a:bodyPr>
+          <a:p>
+            <a:pPr marL="432000" indent="-324000">
+              <a:spcBef>
+                <a:spcPts val="1417"/>
+              </a:spcBef>
+              <a:buClr>
+                <a:srgbClr val="000000"/>
+              </a:buClr>
+              <a:buSzPct val="45000"/>
+              <a:buFont typeface="Wingdings" charset="2"/>
+              <a:buChar char=""/>
+            </a:pPr>
+            <a:r>
+              <a:rPr b="0" lang="en-GB" sz="1800" spc="-1" strike="noStrike">
+                <a:latin typeface="Arial"/>
+              </a:rPr>
+              <a:t>Click to edit the outline text format</a:t>
+            </a:r>
+            <a:endParaRPr b="0" lang="en-GB" sz="1800" spc="-1" strike="noStrike">
+              <a:latin typeface="Arial"/>
+            </a:endParaRPr>
+          </a:p>
+          <a:p>
+            <a:pPr lvl="1" marL="864000" indent="-324000">
+              <a:spcBef>
+                <a:spcPts val="1134"/>
+              </a:spcBef>
+              <a:buClr>
+                <a:srgbClr val="000000"/>
+              </a:buClr>
+              <a:buSzPct val="75000"/>
+              <a:buFont typeface="Symbol" charset="2"/>
+              <a:buChar char=""/>
+            </a:pPr>
+            <a:r>
+              <a:rPr b="0" lang="en-GB" sz="1800" spc="-1" strike="noStrike">
+                <a:latin typeface="Arial"/>
+              </a:rPr>
+              <a:t>Second Outline Level</a:t>
+            </a:r>
+            <a:endParaRPr b="0" lang="en-GB" sz="1800" spc="-1" strike="noStrike">
+              <a:latin typeface="Arial"/>
+            </a:endParaRPr>
+          </a:p>
+          <a:p>
+            <a:pPr lvl="2" marL="1296000" indent="-288000">
+              <a:spcBef>
+                <a:spcPts val="850"/>
+              </a:spcBef>
+              <a:buClr>
+                <a:srgbClr val="000000"/>
+              </a:buClr>
+              <a:buSzPct val="45000"/>
+              <a:buFont typeface="Wingdings" charset="2"/>
+              <a:buChar char=""/>
+            </a:pPr>
+            <a:r>
+              <a:rPr b="0" lang="en-GB" sz="1800" spc="-1" strike="noStrike">
+                <a:latin typeface="Arial"/>
+              </a:rPr>
+              <a:t>Third Outline Level</a:t>
+            </a:r>
+            <a:endParaRPr b="0" lang="en-GB" sz="1800" spc="-1" strike="noStrike">
+              <a:latin typeface="Arial"/>
+            </a:endParaRPr>
+          </a:p>
+          <a:p>
+            <a:pPr lvl="3" marL="1728000" indent="-216000">
+              <a:spcBef>
+                <a:spcPts val="567"/>
+              </a:spcBef>
+              <a:buClr>
+                <a:srgbClr val="000000"/>
+              </a:buClr>
+              <a:buSzPct val="75000"/>
+              <a:buFont typeface="Symbol" charset="2"/>
+              <a:buChar char=""/>
+            </a:pPr>
+            <a:r>
+              <a:rPr b="0" lang="en-GB" sz="1800" spc="-1" strike="noStrike">
+                <a:latin typeface="Arial"/>
+              </a:rPr>
+              <a:t>Fourth Outline Level</a:t>
+            </a:r>
+            <a:endParaRPr b="0" lang="en-GB" sz="1800" spc="-1" strike="noStrike">
+              <a:latin typeface="Arial"/>
+            </a:endParaRPr>
+          </a:p>
+          <a:p>
+            <a:pPr lvl="4" marL="2160000" indent="-216000">
+              <a:spcBef>
+                <a:spcPts val="283"/>
+              </a:spcBef>
+              <a:buClr>
+                <a:srgbClr val="000000"/>
+              </a:buClr>
+              <a:buSzPct val="45000"/>
+              <a:buFont typeface="Wingdings" charset="2"/>
+              <a:buChar char=""/>
+            </a:pPr>
+            <a:r>
+              <a:rPr b="0" lang="en-GB" sz="1800" spc="-1" strike="noStrike">
+                <a:latin typeface="Arial"/>
+              </a:rPr>
+              <a:t>Fifth Outline Level</a:t>
+            </a:r>
+            <a:endParaRPr b="0" lang="en-GB" sz="1800" spc="-1" strike="noStrike">
+              <a:latin typeface="Arial"/>
+            </a:endParaRPr>
+          </a:p>
+          <a:p>
+            <a:pPr lvl="5" marL="2592000" indent="-216000">
+              <a:spcBef>
+                <a:spcPts val="283"/>
+              </a:spcBef>
+              <a:buClr>
+                <a:srgbClr val="000000"/>
+              </a:buClr>
+              <a:buSzPct val="45000"/>
+              <a:buFont typeface="Wingdings" charset="2"/>
+              <a:buChar char=""/>
+            </a:pPr>
+            <a:r>
+              <a:rPr b="0" lang="en-GB" sz="1800" spc="-1" strike="noStrike">
+                <a:latin typeface="Arial"/>
+              </a:rPr>
+              <a:t>Sixth Outline Level</a:t>
+            </a:r>
+            <a:endParaRPr b="0" lang="en-GB" sz="1800" spc="-1" strike="noStrike">
+              <a:latin typeface="Arial"/>
+            </a:endParaRPr>
+          </a:p>
+          <a:p>
+            <a:pPr lvl="6" marL="3024000" indent="-216000">
+              <a:spcBef>
+                <a:spcPts val="283"/>
+              </a:spcBef>
+              <a:buClr>
+                <a:srgbClr val="000000"/>
+              </a:buClr>
+              <a:buSzPct val="45000"/>
+              <a:buFont typeface="Wingdings" charset="2"/>
+              <a:buChar char=""/>
+            </a:pPr>
+            <a:r>
+              <a:rPr b="0" lang="en-GB" sz="1800" spc="-1" strike="noStrike">
+                <a:latin typeface="Arial"/>
+              </a:rPr>
+              <a:t>Seventh Outline Level</a:t>
+            </a:r>
+            <a:endParaRPr b="0" lang="en-GB" sz="1800" spc="-1" strike="noStrike">
+              <a:latin typeface="Arial"/>
+            </a:endParaRPr>
+          </a:p>
+        </p:txBody>
+      </p:sp>
+      <p:sp>
+        <p:nvSpPr>
+          <p:cNvPr id="2" name="PlaceHolder 3"/>
+          <p:cNvSpPr>
+            <a:spLocks noGrp="1"/>
+          </p:cNvSpPr>
+          <p:nvPr>
             <p:ph type="ftr" idx="1"/>
           </p:nvPr>
         </p:nvSpPr>
         <p:spPr>
           <a:xfrm>
             <a:off x="10600920" y="38138040"/>
-            <a:ext cx="10800720" cy="2189880"/>
+            <a:ext cx="10800360" cy="2189520"/>
           </a:xfrm>
           <a:prstGeom prst="rect">
             <a:avLst/>
@@ -2391,7 +2574,7 @@
       </p:sp>
       <p:sp>
         <p:nvSpPr>
-          <p:cNvPr id="2" name="PlaceHolder 3"/>
+          <p:cNvPr id="3" name="PlaceHolder 4"/>
           <p:cNvSpPr>
             <a:spLocks noGrp="1"/>
           </p:cNvSpPr>
@@ -2402,7 +2585,7 @@
         <p:spPr>
           <a:xfrm>
             <a:off x="22602600" y="38138040"/>
-            <a:ext cx="7200000" cy="2189880"/>
+            <a:ext cx="7199640" cy="2189520"/>
           </a:xfrm>
           <a:prstGeom prst="rect">
             <a:avLst/>
@@ -2437,7 +2620,7 @@
               </a:lnSpc>
               <a:buNone/>
             </a:pPr>
-            <a:fld id="{27B225E2-7DF5-4FBD-B59D-AA921B59272E}" type="slidenum">
+            <a:fld id="{4C6CD113-7502-4585-ADD7-42B1D3218E87}" type="slidenum">
               <a:rPr b="0" lang="en-US" sz="3970" spc="-1" strike="noStrike">
                 <a:solidFill>
                   <a:srgbClr val="8b8b8b"/>
@@ -2454,7 +2637,7 @@
       </p:sp>
       <p:sp>
         <p:nvSpPr>
-          <p:cNvPr id="3" name="PlaceHolder 4"/>
+          <p:cNvPr id="4" name="PlaceHolder 5"/>
           <p:cNvSpPr>
             <a:spLocks noGrp="1"/>
           </p:cNvSpPr>
@@ -2465,7 +2648,7 @@
         <p:spPr>
           <a:xfrm>
             <a:off x="2200320" y="38138040"/>
-            <a:ext cx="7200000" cy="2189880"/>
+            <a:ext cx="7199640" cy="2189520"/>
           </a:xfrm>
           <a:prstGeom prst="rect">
             <a:avLst/>
@@ -2495,189 +2678,6 @@
             </a:r>
             <a:endParaRPr b="0" lang="en-GB" sz="1400" spc="-1" strike="noStrike">
               <a:latin typeface="Times New Roman"/>
-            </a:endParaRPr>
-          </a:p>
-        </p:txBody>
-      </p:sp>
-      <p:sp>
-        <p:nvSpPr>
-          <p:cNvPr id="4" name="PlaceHolder 5"/>
-          <p:cNvSpPr>
-            <a:spLocks noGrp="1"/>
-          </p:cNvSpPr>
-          <p:nvPr>
-            <p:ph type="body"/>
-          </p:nvPr>
-        </p:nvSpPr>
-        <p:spPr>
-          <a:xfrm>
-            <a:off x="1600200" y="9628560"/>
-            <a:ext cx="28803240" cy="23865480"/>
-          </a:xfrm>
-          <a:prstGeom prst="rect">
-            <a:avLst/>
-          </a:prstGeom>
-          <a:noFill/>
-          <a:ln w="0">
-            <a:noFill/>
-          </a:ln>
-        </p:spPr>
-        <p:txBody>
-          <a:bodyPr lIns="0" rIns="0" tIns="0" bIns="0" anchor="t">
-            <a:normAutofit/>
-          </a:bodyPr>
-          <a:p>
-            <a:pPr marL="432000" indent="-324000">
-              <a:spcBef>
-                <a:spcPts val="1417"/>
-              </a:spcBef>
-              <a:buClr>
-                <a:srgbClr val="000000"/>
-              </a:buClr>
-              <a:buSzPct val="45000"/>
-              <a:buFont typeface="Wingdings" charset="2"/>
-              <a:buChar char=""/>
-            </a:pPr>
-            <a:r>
-              <a:rPr b="0" lang="en-GB" sz="3200" spc="-1" strike="noStrike">
-                <a:latin typeface="Arial"/>
-              </a:rPr>
-              <a:t>Click to edit the outline text format</a:t>
-            </a:r>
-            <a:endParaRPr b="0" lang="en-GB" sz="3200" spc="-1" strike="noStrike">
-              <a:latin typeface="Arial"/>
-            </a:endParaRPr>
-          </a:p>
-          <a:p>
-            <a:pPr lvl="1" marL="864000" indent="-324000">
-              <a:spcBef>
-                <a:spcPts val="1134"/>
-              </a:spcBef>
-              <a:buClr>
-                <a:srgbClr val="000000"/>
-              </a:buClr>
-              <a:buSzPct val="75000"/>
-              <a:buFont typeface="Symbol" charset="2"/>
-              <a:buChar char=""/>
-            </a:pPr>
-            <a:r>
-              <a:rPr b="0" lang="en-GB" sz="2800" spc="-1" strike="noStrike">
-                <a:latin typeface="Arial"/>
-              </a:rPr>
-              <a:t>Second Outline Level</a:t>
-            </a:r>
-            <a:endParaRPr b="0" lang="en-GB" sz="2800" spc="-1" strike="noStrike">
-              <a:latin typeface="Arial"/>
-            </a:endParaRPr>
-          </a:p>
-          <a:p>
-            <a:pPr lvl="2" marL="1296000" indent="-288000">
-              <a:spcBef>
-                <a:spcPts val="850"/>
-              </a:spcBef>
-              <a:buClr>
-                <a:srgbClr val="000000"/>
-              </a:buClr>
-              <a:buSzPct val="45000"/>
-              <a:buFont typeface="Wingdings" charset="2"/>
-              <a:buChar char=""/>
-            </a:pPr>
-            <a:r>
-              <a:rPr b="0" lang="en-GB" sz="2400" spc="-1" strike="noStrike">
-                <a:latin typeface="Arial"/>
-              </a:rPr>
-              <a:t>Third Outline Level</a:t>
-            </a:r>
-            <a:endParaRPr b="0" lang="en-GB" sz="2400" spc="-1" strike="noStrike">
-              <a:latin typeface="Arial"/>
-            </a:endParaRPr>
-          </a:p>
-          <a:p>
-            <a:pPr lvl="3" marL="1728000" indent="-216000">
-              <a:spcBef>
-                <a:spcPts val="567"/>
-              </a:spcBef>
-              <a:buClr>
-                <a:srgbClr val="000000"/>
-              </a:buClr>
-              <a:buSzPct val="75000"/>
-              <a:buFont typeface="Symbol" charset="2"/>
-              <a:buChar char=""/>
-            </a:pPr>
-            <a:r>
-              <a:rPr b="0" lang="en-GB" sz="2000" spc="-1" strike="noStrike">
-                <a:latin typeface="Arial"/>
-              </a:rPr>
-              <a:t>Fourth Outline Level</a:t>
-            </a:r>
-            <a:endParaRPr b="0" lang="en-GB" sz="2000" spc="-1" strike="noStrike">
-              <a:latin typeface="Arial"/>
-            </a:endParaRPr>
-          </a:p>
-          <a:p>
-            <a:pPr lvl="4" marL="2160000" indent="-216000">
-              <a:spcBef>
-                <a:spcPts val="283"/>
-              </a:spcBef>
-              <a:buClr>
-                <a:srgbClr val="000000"/>
-              </a:buClr>
-              <a:buSzPct val="45000"/>
-              <a:buFont typeface="Wingdings" charset="2"/>
-              <a:buChar char=""/>
-            </a:pPr>
-            <a:r>
-              <a:rPr b="0" lang="en-GB" sz="2000" spc="-1" strike="noStrike">
-                <a:latin typeface="Arial"/>
-              </a:rPr>
-              <a:t>Fifth Outline Level</a:t>
-            </a:r>
-            <a:endParaRPr b="0" lang="en-GB" sz="2000" spc="-1" strike="noStrike">
-              <a:latin typeface="Arial"/>
-            </a:endParaRPr>
-          </a:p>
-          <a:p>
-            <a:pPr lvl="5" marL="2592000" indent="-216000">
-              <a:spcBef>
-                <a:spcPts val="283"/>
-              </a:spcBef>
-              <a:buClr>
-                <a:srgbClr val="000000"/>
-              </a:buClr>
-              <a:buSzPct val="45000"/>
-              <a:buFont typeface="Wingdings" charset="2"/>
-              <a:buChar char=""/>
-            </a:pPr>
-            <a:r>
-              <a:rPr b="0" lang="en-GB" sz="2000" spc="-1" strike="noStrike">
-                <a:latin typeface="Arial"/>
-              </a:rPr>
-              <a:t>Sixth Outline Level</a:t>
-            </a:r>
-            <a:endParaRPr b="0" lang="en-GB" sz="2000" spc="-1" strike="noStrike">
-              <a:latin typeface="Arial"/>
-            </a:endParaRPr>
-          </a:p>
-          <a:p>
-            <a:pPr lvl="6" marL="3024000" indent="-216000">
-              <a:spcBef>
-                <a:spcPts val="283"/>
-              </a:spcBef>
-              <a:buClr>
-                <a:srgbClr val="000000"/>
-              </a:buClr>
-              <a:buSzPct val="45000"/>
-              <a:buFont typeface="Wingdings" charset="2"/>
-              <a:buChar char=""/>
-            </a:pPr>
-            <a:r>
-              <a:rPr b="0" lang="en-GB" sz="2000" spc="-1" strike="noStrike">
-                <a:latin typeface="Arial"/>
-              </a:rPr>
-              <a:t>Seventh Outline Level</a:t>
-            </a:r>
-            <a:endParaRPr b="0" lang="en-GB" sz="2000" spc="-1" strike="noStrike">
-              <a:latin typeface="Arial"/>
             </a:endParaRPr>
           </a:p>
         </p:txBody>
@@ -2728,31 +2728,27 @@
       </p:grpSpPr>
       <p:sp>
         <p:nvSpPr>
-          <p:cNvPr id="41" name="Rectangle 2"/>
+          <p:cNvPr id="41" name="Rectangle 10"/>
           <p:cNvSpPr/>
           <p:nvPr/>
         </p:nvSpPr>
         <p:spPr>
           <a:xfrm>
-            <a:off x="1897560" y="24641280"/>
-            <a:ext cx="14302440" cy="8460000"/>
+            <a:off x="0" y="38340000"/>
+            <a:ext cx="32219280" cy="2842200"/>
           </a:xfrm>
           <a:prstGeom prst="rect">
             <a:avLst/>
           </a:prstGeom>
           <a:solidFill>
-            <a:schemeClr val="bg1"/>
+            <a:schemeClr val="tx1">
+              <a:lumMod val="85000"/>
+              <a:lumOff val="15000"/>
+            </a:schemeClr>
           </a:solidFill>
           <a:ln>
             <a:noFill/>
           </a:ln>
-          <a:effectLst>
-            <a:outerShdw algn="tl" blurRad="723960" dir="2700000" dist="114042" rotWithShape="0">
-              <a:srgbClr val="000000">
-                <a:alpha val="10000"/>
-              </a:srgbClr>
-            </a:outerShdw>
-          </a:effectLst>
         </p:spPr>
         <p:style>
           <a:lnRef idx="2">
@@ -2768,56 +2764,34 @@
           </a:effectRef>
           <a:fontRef idx="minor"/>
         </p:style>
-        <p:txBody>
-          <a:bodyPr lIns="90000" rIns="90000" tIns="45000" bIns="45000" anchor="ctr">
-            <a:noAutofit/>
-          </a:bodyPr>
-          <a:p>
-            <a:pPr algn="ctr">
-              <a:lnSpc>
-                <a:spcPct val="100000"/>
-              </a:lnSpc>
-              <a:buNone/>
-            </a:pPr>
-            <a:r>
-              <a:rPr b="0" lang="en-US" sz="1700" spc="-1" strike="noStrike">
-                <a:solidFill>
-                  <a:srgbClr val="ffffff"/>
-                </a:solidFill>
-                <a:latin typeface="Calibri"/>
-                <a:ea typeface="DejaVu Sans"/>
-              </a:rPr>
-              <a:t>v</a:t>
-            </a:r>
-            <a:endParaRPr b="0" lang="en-GB" sz="1700" spc="-1" strike="noStrike">
-              <a:latin typeface="Arial"/>
-            </a:endParaRPr>
-          </a:p>
-        </p:txBody>
-      </p:sp>
-      <p:sp>
-        <p:nvSpPr>
-          <p:cNvPr id="42" name="Rectangle 10"/>
+      </p:sp>
+      <p:sp>
+        <p:nvSpPr>
+          <p:cNvPr id="42" name="Rectangle 4"/>
           <p:cNvSpPr/>
           <p:nvPr/>
         </p:nvSpPr>
         <p:spPr>
           <a:xfrm>
-            <a:off x="0" y="38340000"/>
-            <a:ext cx="32219640" cy="2842560"/>
+            <a:off x="360000" y="38520000"/>
+            <a:ext cx="5400000" cy="2520000"/>
           </a:xfrm>
           <a:prstGeom prst="rect">
             <a:avLst/>
           </a:prstGeom>
           <a:solidFill>
-            <a:schemeClr val="tx1">
-              <a:lumMod val="85000"/>
-              <a:lumOff val="15000"/>
-            </a:schemeClr>
+            <a:schemeClr val="bg1"/>
           </a:solidFill>
           <a:ln>
             <a:noFill/>
           </a:ln>
+          <a:effectLst>
+            <a:outerShdw algn="tl" blurRad="723960" dir="2700000" dist="114042" rotWithShape="0">
+              <a:srgbClr val="000000">
+                <a:alpha val="10000"/>
+              </a:srgbClr>
+            </a:outerShdw>
+          </a:effectLst>
         </p:spPr>
         <p:style>
           <a:lnRef idx="2">
@@ -2833,30 +2807,60 @@
           </a:effectRef>
           <a:fontRef idx="minor"/>
         </p:style>
-      </p:sp>
-      <p:sp>
-        <p:nvSpPr>
-          <p:cNvPr id="43" name="Rectangle 9"/>
+        <p:txBody>
+          <a:bodyPr lIns="90000" rIns="90000" tIns="45000" bIns="45000" anchor="ctr">
+            <a:noAutofit/>
+          </a:bodyPr>
+          <a:p>
+            <a:pPr algn="ctr">
+              <a:lnSpc>
+                <a:spcPct val="100000"/>
+              </a:lnSpc>
+              <a:buNone/>
+            </a:pPr>
+            <a:r>
+              <a:rPr b="0" lang="en-US" sz="1700" spc="-1" strike="noStrike">
+                <a:solidFill>
+                  <a:srgbClr val="ffffff"/>
+                </a:solidFill>
+                <a:latin typeface="Calibri"/>
+                <a:ea typeface="DejaVu Sans"/>
+              </a:rPr>
+              <a:t>v</a:t>
+            </a:r>
+            <a:endParaRPr b="0" lang="en-GB" sz="1700" spc="-1" strike="noStrike">
+              <a:latin typeface="Arial"/>
+            </a:endParaRPr>
+          </a:p>
+        </p:txBody>
+      </p:sp>
+      <p:sp>
+        <p:nvSpPr>
+          <p:cNvPr id="43" name="Rectangle 2"/>
           <p:cNvSpPr/>
           <p:nvPr/>
         </p:nvSpPr>
         <p:spPr>
           <a:xfrm>
-            <a:off x="0" y="-62280"/>
-            <a:ext cx="32219640" cy="5945040"/>
+            <a:off x="1897560" y="24641280"/>
+            <a:ext cx="14302080" cy="8459640"/>
           </a:xfrm>
           <a:prstGeom prst="rect">
             <a:avLst/>
           </a:prstGeom>
           <a:solidFill>
-            <a:schemeClr val="tx1">
-              <a:lumMod val="85000"/>
-              <a:lumOff val="15000"/>
-            </a:schemeClr>
+            <a:schemeClr val="bg1"/>
           </a:solidFill>
           <a:ln>
             <a:noFill/>
           </a:ln>
+          <a:effectLst>
+            <a:outerShdw algn="tl" blurRad="723960" dir="2700000" dist="114042" rotWithShape="0">
+              <a:srgbClr val="000000">
+                <a:alpha val="10000"/>
+              </a:srgbClr>
+            </a:outerShdw>
+          </a:effectLst>
         </p:spPr>
         <p:style>
           <a:lnRef idx="2">
@@ -2872,148 +2876,56 @@
           </a:effectRef>
           <a:fontRef idx="minor"/>
         </p:style>
-      </p:sp>
-      <p:sp>
-        <p:nvSpPr>
-          <p:cNvPr id="44" name="Rectangle 1"/>
-          <p:cNvSpPr/>
-          <p:nvPr/>
-        </p:nvSpPr>
-        <p:spPr>
-          <a:xfrm>
-            <a:off x="1882800" y="416160"/>
-            <a:ext cx="27377280" cy="4725000"/>
-          </a:xfrm>
-          <a:prstGeom prst="rect">
-            <a:avLst/>
-          </a:prstGeom>
-          <a:noFill/>
-          <a:ln w="0">
-            <a:noFill/>
-          </a:ln>
-        </p:spPr>
-        <p:style>
-          <a:lnRef idx="0"/>
-          <a:fillRef idx="0"/>
-          <a:effectRef idx="0"/>
-          <a:fontRef idx="minor"/>
-        </p:style>
-        <p:txBody>
-          <a:bodyPr lIns="90000" rIns="90000" tIns="45000" bIns="45000" anchor="t">
-            <a:spAutoFit/>
-          </a:bodyPr>
-          <a:p>
-            <a:pPr>
-              <a:lnSpc>
-                <a:spcPct val="130000"/>
-              </a:lnSpc>
-              <a:buNone/>
-            </a:pPr>
-            <a:r>
-              <a:rPr b="1" lang="en-US" sz="11700" spc="-1" strike="noStrike">
-                <a:solidFill>
-                  <a:srgbClr val="ffffff"/>
-                </a:solidFill>
-                <a:latin typeface="Arial"/>
-                <a:ea typeface="Segoe UI Black"/>
-              </a:rPr>
-              <a:t>Field strength and scan quality influence brain age estimates</a:t>
-            </a:r>
-            <a:endParaRPr b="0" lang="en-GB" sz="11700" spc="-1" strike="noStrike">
-              <a:latin typeface="Arial"/>
-            </a:endParaRPr>
-          </a:p>
-        </p:txBody>
-      </p:sp>
-      <p:sp>
-        <p:nvSpPr>
-          <p:cNvPr id="45" name="TextBox 21"/>
-          <p:cNvSpPr/>
-          <p:nvPr/>
-        </p:nvSpPr>
-        <p:spPr>
-          <a:xfrm>
-            <a:off x="7382880" y="38800440"/>
-            <a:ext cx="18173160" cy="2100600"/>
-          </a:xfrm>
-          <a:prstGeom prst="rect">
-            <a:avLst/>
-          </a:prstGeom>
-          <a:noFill/>
-          <a:ln w="0">
-            <a:noFill/>
-          </a:ln>
-        </p:spPr>
-        <p:style>
-          <a:lnRef idx="0"/>
-          <a:fillRef idx="0"/>
-          <a:effectRef idx="0"/>
-          <a:fontRef idx="minor"/>
-        </p:style>
-        <p:txBody>
-          <a:bodyPr lIns="90000" rIns="90000" tIns="45000" bIns="45000" anchor="t">
-            <a:spAutoFit/>
-          </a:bodyPr>
-          <a:p>
-            <a:pPr>
+        <p:txBody>
+          <a:bodyPr lIns="90000" rIns="90000" tIns="45000" bIns="45000" anchor="ctr">
+            <a:noAutofit/>
+          </a:bodyPr>
+          <a:p>
+            <a:pPr algn="ctr">
               <a:lnSpc>
                 <a:spcPct val="100000"/>
               </a:lnSpc>
               <a:buNone/>
             </a:pPr>
             <a:r>
-              <a:rPr b="1" lang="en-US" sz="4400" spc="-1" strike="noStrike">
+              <a:rPr b="0" lang="en-US" sz="1700" spc="-1" strike="noStrike">
                 <a:solidFill>
                   <a:srgbClr val="ffffff"/>
                 </a:solidFill>
-                <a:latin typeface="Segoe UI Light"/>
-                <a:ea typeface="Noto Sans CJK SC"/>
-              </a:rPr>
-              <a:t>Max Korbmacher (makor@hvl.no)</a:t>
-            </a:r>
-            <a:r>
-              <a:rPr b="0" lang="en-US" sz="4400" spc="-1" strike="noStrike">
-                <a:solidFill>
-                  <a:srgbClr val="ffffff"/>
-                </a:solidFill>
-                <a:latin typeface="Segoe UI Light"/>
-                <a:ea typeface="Noto Sans CJK SC"/>
-              </a:rPr>
-              <a:t>, Meng-Yun Wang, Rune Eikeland, Ralph Buchert, Esten Leonardsen, Lars T. Westlye, Ivan I. Maximov, Karsten Specht</a:t>
-            </a:r>
-            <a:endParaRPr b="0" lang="en-GB" sz="4400" spc="-1" strike="noStrike">
-              <a:latin typeface="Arial"/>
-            </a:endParaRPr>
-          </a:p>
-        </p:txBody>
-      </p:sp>
-      <p:sp>
-        <p:nvSpPr>
-          <p:cNvPr id="46" name="Rectangle 16"/>
+                <a:latin typeface="Calibri"/>
+                <a:ea typeface="DejaVu Sans"/>
+              </a:rPr>
+              <a:t>v</a:t>
+            </a:r>
+            <a:endParaRPr b="0" lang="en-GB" sz="1700" spc="-1" strike="noStrike">
+              <a:latin typeface="Arial"/>
+            </a:endParaRPr>
+          </a:p>
+        </p:txBody>
+      </p:sp>
+      <p:sp>
+        <p:nvSpPr>
+          <p:cNvPr id="44" name="Rectangle 9"/>
           <p:cNvSpPr/>
           <p:nvPr/>
         </p:nvSpPr>
         <p:spPr>
           <a:xfrm>
-            <a:off x="1897560" y="16067520"/>
-            <a:ext cx="28522440" cy="7949880"/>
+            <a:off x="0" y="-62280"/>
+            <a:ext cx="32219280" cy="5944680"/>
           </a:xfrm>
           <a:prstGeom prst="rect">
             <a:avLst/>
           </a:prstGeom>
           <a:solidFill>
-            <a:schemeClr val="bg1"/>
+            <a:schemeClr val="tx1">
+              <a:lumMod val="85000"/>
+              <a:lumOff val="15000"/>
+            </a:schemeClr>
           </a:solidFill>
           <a:ln>
             <a:noFill/>
           </a:ln>
-          <a:effectLst>
-            <a:outerShdw algn="tl" blurRad="723960" dir="2700000" dist="114042" rotWithShape="0">
-              <a:srgbClr val="000000">
-                <a:alpha val="10000"/>
-              </a:srgbClr>
-            </a:outerShdw>
-          </a:effectLst>
         </p:spPr>
         <p:style>
           <a:lnRef idx="2">
@@ -3029,43 +2941,17 @@
           </a:effectRef>
           <a:fontRef idx="minor"/>
         </p:style>
-        <p:txBody>
-          <a:bodyPr lIns="90000" rIns="90000" tIns="45000" bIns="45000" anchor="ctr">
-            <a:noAutofit/>
-          </a:bodyPr>
-          <a:p>
-            <a:pPr algn="ctr">
-              <a:lnSpc>
-                <a:spcPct val="100000"/>
-              </a:lnSpc>
-              <a:buNone/>
-            </a:pPr>
-            <a:r>
-              <a:rPr b="0" lang="en-US" sz="1700" spc="-1" strike="noStrike">
-                <a:solidFill>
-                  <a:srgbClr val="ffffff"/>
-                </a:solidFill>
-                <a:latin typeface="Calibri"/>
-                <a:ea typeface="DejaVu Sans"/>
-              </a:rPr>
-              <a:t>v</a:t>
-            </a:r>
-            <a:endParaRPr b="0" lang="en-GB" sz="1700" spc="-1" strike="noStrike">
-              <a:latin typeface="Arial"/>
-            </a:endParaRPr>
-          </a:p>
-        </p:txBody>
-      </p:sp>
-      <p:sp>
-        <p:nvSpPr>
-          <p:cNvPr id="47" name="TextBox 31"/>
+      </p:sp>
+      <p:sp>
+        <p:nvSpPr>
+          <p:cNvPr id="45" name="Rectangle 1"/>
           <p:cNvSpPr/>
           <p:nvPr/>
         </p:nvSpPr>
         <p:spPr>
           <a:xfrm>
-            <a:off x="2138400" y="16286400"/>
-            <a:ext cx="8661600" cy="6810480"/>
+            <a:off x="1882800" y="416160"/>
+            <a:ext cx="27376920" cy="4725000"/>
           </a:xfrm>
           <a:prstGeom prst="rect">
             <a:avLst/>
@@ -3088,65 +2974,41 @@
           <a:p>
             <a:pPr>
               <a:lnSpc>
-                <a:spcPct val="150000"/>
+                <a:spcPct val="130000"/>
               </a:lnSpc>
               <a:buNone/>
             </a:pPr>
             <a:r>
-              <a:rPr b="1" lang="en-US" sz="4200" spc="-1" strike="noStrike">
-                <a:solidFill>
-                  <a:srgbClr val="000000"/>
-                </a:solidFill>
-                <a:latin typeface="Segoe UI Black"/>
+              <a:rPr b="1" lang="en-US" sz="11700" spc="-1" strike="noStrike">
+                <a:solidFill>
+                  <a:srgbClr val="ffffff"/>
+                </a:solidFill>
+                <a:latin typeface="Arial"/>
                 <a:ea typeface="Segoe UI Black"/>
               </a:rPr>
-              <a:t>Result 1:</a:t>
-            </a:r>
-            <a:r>
-              <a:rPr b="0" lang="en-US" sz="4200" spc="-1" strike="noStrike">
-                <a:solidFill>
-                  <a:srgbClr val="000000"/>
-                </a:solidFill>
-                <a:latin typeface="Segoe UI Black"/>
-                <a:ea typeface="Segoe UI Black"/>
-              </a:rPr>
-              <a:t> Crude within-subject correlations between age and brain age revealed differing directionalities of slopes across subjects, with the correlation being only statistically significant in </a:t>
-            </a:r>
-            <a:r>
-              <a:rPr b="0" lang="en-US" sz="4200" spc="-1" strike="noStrike">
-                <a:solidFill>
-                  <a:srgbClr val="000000"/>
-                </a:solidFill>
-                <a:latin typeface="Segoe UI Black"/>
-                <a:ea typeface="Segoe UI Black"/>
-              </a:rPr>
-              <a:t>FTHP1.</a:t>
-            </a:r>
-            <a:endParaRPr b="0" lang="en-GB" sz="4200" spc="-1" strike="noStrike">
-              <a:latin typeface="Arial"/>
-            </a:endParaRPr>
-          </a:p>
-        </p:txBody>
-      </p:sp>
-      <p:sp>
-        <p:nvSpPr>
-          <p:cNvPr id="48" name="TextBox 2"/>
+              <a:t>Field strength and potentially scan quality influence brain age estimates</a:t>
+            </a:r>
+            <a:endParaRPr b="0" lang="en-GB" sz="11700" spc="-1" strike="noStrike">
+              <a:latin typeface="Arial"/>
+            </a:endParaRPr>
+          </a:p>
+        </p:txBody>
+      </p:sp>
+      <p:sp>
+        <p:nvSpPr>
+          <p:cNvPr id="46" name="TextBox 21"/>
           <p:cNvSpPr/>
           <p:nvPr/>
         </p:nvSpPr>
         <p:spPr>
           <a:xfrm>
-            <a:off x="1882800" y="8767080"/>
-            <a:ext cx="28443960" cy="6625080"/>
-          </a:xfrm>
-          <a:prstGeom prst="rect">
-            <a:avLst/>
-          </a:prstGeom>
-          <a:solidFill>
-            <a:schemeClr val="bg1">
-              <a:lumMod val="95000"/>
-            </a:schemeClr>
-          </a:solidFill>
+            <a:off x="7382880" y="38458080"/>
+            <a:ext cx="18172800" cy="2649240"/>
+          </a:xfrm>
+          <a:prstGeom prst="rect">
+            <a:avLst/>
+          </a:prstGeom>
+          <a:noFill/>
           <a:ln w="0">
             <a:noFill/>
           </a:ln>
@@ -3158,159 +3020,6 @@
           <a:fontRef idx="minor"/>
         </p:style>
         <p:txBody>
-          <a:bodyPr lIns="432360" rIns="432360" tIns="432360" bIns="432360" anchor="t">
-            <a:spAutoFit/>
-          </a:bodyPr>
-          <a:p>
-            <a:pPr>
-              <a:lnSpc>
-                <a:spcPct val="150000"/>
-              </a:lnSpc>
-              <a:buNone/>
-            </a:pPr>
-            <a:r>
-              <a:rPr b="1" lang="en-US" sz="4200" spc="-1" strike="noStrike">
-                <a:solidFill>
-                  <a:srgbClr val="000000"/>
-                </a:solidFill>
-                <a:latin typeface="Segoe UI"/>
-                <a:ea typeface="Segoe UI Black"/>
-              </a:rPr>
-              <a:t>Background: </a:t>
-            </a:r>
-            <a:r>
-              <a:rPr b="0" lang="en-US" sz="4200" spc="-1" strike="noStrike">
-                <a:solidFill>
-                  <a:srgbClr val="000000"/>
-                </a:solidFill>
-                <a:latin typeface="Segoe UI"/>
-                <a:ea typeface="Segoe UI Black"/>
-              </a:rPr>
-              <a:t>Brain age is a promising biomarker of brain or general health. However, to extend the metric’s clinical applications, the large intra-individual varibility in age predictions needs adressing.</a:t>
-            </a:r>
-            <a:endParaRPr b="0" lang="en-GB" sz="4200" spc="-1" strike="noStrike">
-              <a:latin typeface="Arial"/>
-            </a:endParaRPr>
-          </a:p>
-          <a:p>
-            <a:pPr>
-              <a:lnSpc>
-                <a:spcPct val="150000"/>
-              </a:lnSpc>
-              <a:buNone/>
-            </a:pPr>
-            <a:r>
-              <a:rPr b="1" lang="en-US" sz="4200" spc="-1" strike="noStrike">
-                <a:solidFill>
-                  <a:srgbClr val="000000"/>
-                </a:solidFill>
-                <a:latin typeface="Segoe UI"/>
-                <a:ea typeface="Segoe UI Black"/>
-              </a:rPr>
-              <a:t>Method:</a:t>
-            </a:r>
-            <a:r>
-              <a:rPr b="0" lang="en-US" sz="4200" spc="-1" strike="noStrike">
-                <a:solidFill>
-                  <a:srgbClr val="000000"/>
-                </a:solidFill>
-                <a:latin typeface="Segoe UI"/>
-                <a:ea typeface="Segoe UI Black"/>
-              </a:rPr>
-              <a:t>  We used the pre-trained deep neural network </a:t>
-            </a:r>
-            <a:r>
-              <a:rPr b="0" i="1" lang="en-US" sz="4200" spc="-1" strike="noStrike">
-                <a:solidFill>
-                  <a:srgbClr val="000000"/>
-                </a:solidFill>
-                <a:latin typeface="Segoe UI"/>
-                <a:ea typeface="Segoe UI Black"/>
-              </a:rPr>
-              <a:t>pyment</a:t>
-            </a:r>
-            <a:r>
-              <a:rPr b="0" lang="en-US" sz="4200" spc="-1" strike="noStrike">
-                <a:solidFill>
-                  <a:srgbClr val="000000"/>
-                </a:solidFill>
-                <a:latin typeface="Segoe UI"/>
-                <a:ea typeface="Segoe UI Black"/>
-              </a:rPr>
-              <a:t> to predict brain ages from densly sampled T1-weighted magnetic resonance imaging data from three individuals (BBSC1-3) scanned in total N</a:t>
-            </a:r>
-            <a:r>
-              <a:rPr b="0" lang="en-US" sz="4200" spc="-1" strike="noStrike" baseline="-8000">
-                <a:solidFill>
-                  <a:srgbClr val="000000"/>
-                </a:solidFill>
-                <a:latin typeface="Segoe UI"/>
-                <a:ea typeface="Segoe UI Black"/>
-              </a:rPr>
-              <a:t>BBSC</a:t>
-            </a:r>
-            <a:r>
-              <a:rPr b="0" lang="en-US" sz="4200" spc="-1" strike="noStrike">
-                <a:solidFill>
-                  <a:srgbClr val="000000"/>
-                </a:solidFill>
-                <a:latin typeface="Segoe UI"/>
-                <a:ea typeface="Segoe UI Black"/>
-              </a:rPr>
-              <a:t> = 103 times over a one-year interval, and an independent data set including one individual (FTHP1) scanned N</a:t>
-            </a:r>
-            <a:r>
-              <a:rPr b="0" lang="en-US" sz="4200" spc="-1" strike="noStrike" baseline="-8000">
-                <a:solidFill>
-                  <a:srgbClr val="000000"/>
-                </a:solidFill>
-                <a:latin typeface="Segoe UI"/>
-                <a:ea typeface="Segoe UI Black"/>
-              </a:rPr>
-              <a:t>FTHP </a:t>
-            </a:r>
-            <a:r>
-              <a:rPr b="0" lang="en-US" sz="4200" spc="-1" strike="noStrike">
-                <a:solidFill>
-                  <a:srgbClr val="000000"/>
-                </a:solidFill>
-                <a:latin typeface="Segoe UI"/>
-                <a:ea typeface="Segoe UI Black"/>
-              </a:rPr>
-              <a:t>= 557 times over a three-year interval.</a:t>
-            </a:r>
-            <a:endParaRPr b="0" lang="en-GB" sz="4200" spc="-1" strike="noStrike">
-              <a:latin typeface="Arial"/>
-            </a:endParaRPr>
-          </a:p>
-        </p:txBody>
-      </p:sp>
-      <p:sp>
-        <p:nvSpPr>
-          <p:cNvPr id="49" name="TextBox 40"/>
-          <p:cNvSpPr/>
-          <p:nvPr/>
-        </p:nvSpPr>
-        <p:spPr>
-          <a:xfrm>
-            <a:off x="1839600" y="6276240"/>
-            <a:ext cx="29175480" cy="1991160"/>
-          </a:xfrm>
-          <a:prstGeom prst="rect">
-            <a:avLst/>
-          </a:prstGeom>
-          <a:noFill/>
-          <a:ln w="0">
-            <a:noFill/>
-          </a:ln>
-        </p:spPr>
-        <p:style>
-          <a:lnRef idx="0"/>
-          <a:fillRef idx="0"/>
-          <a:effectRef idx="0"/>
-          <a:fontRef idx="minor"/>
-        </p:style>
-        <p:txBody>
           <a:bodyPr lIns="90000" rIns="90000" tIns="45000" bIns="45000" anchor="t">
             <a:spAutoFit/>
           </a:bodyPr>
@@ -3322,419 +3031,41 @@
               <a:buNone/>
             </a:pPr>
             <a:r>
-              <a:rPr b="0" i="1" lang="en-US" sz="6240" spc="-1" strike="noStrike">
-                <a:solidFill>
-                  <a:srgbClr val="262626"/>
-                </a:solidFill>
-                <a:latin typeface="Segoe UI"/>
-                <a:ea typeface="DejaVu Sans"/>
-              </a:rPr>
-              <a:t>Brain age predictions in longitudinal data reveal the importance of scan quality and field strength</a:t>
-            </a:r>
-            <a:endParaRPr b="0" lang="en-GB" sz="6240" spc="-1" strike="noStrike">
-              <a:latin typeface="Arial"/>
-            </a:endParaRPr>
-          </a:p>
-        </p:txBody>
-      </p:sp>
-      <p:sp>
-        <p:nvSpPr>
-          <p:cNvPr id="50" name="TextBox 1"/>
+              <a:rPr b="1" lang="en-US" sz="4200" spc="-1" strike="noStrike">
+                <a:solidFill>
+                  <a:srgbClr val="ffffff"/>
+                </a:solidFill>
+                <a:latin typeface="Segoe UI Light"/>
+                <a:ea typeface="Noto Sans CJK SC"/>
+              </a:rPr>
+              <a:t>Max Korbmacher (makor@hvl.no)</a:t>
+            </a:r>
+            <a:r>
+              <a:rPr b="0" lang="en-US" sz="4200" spc="-1" strike="noStrike">
+                <a:solidFill>
+                  <a:srgbClr val="ffffff"/>
+                </a:solidFill>
+                <a:latin typeface="Segoe UI Light"/>
+                <a:ea typeface="Noto Sans CJK SC"/>
+              </a:rPr>
+              <a:t>, Meng-Yun Wang, Rune Eikeland, Ralph Buchert, Ole A. Andreassen, Thomas Espeseth, Esten Leonardsen, Lars T. Westlye, Ivan I. Maximov, Karsten Specht</a:t>
+            </a:r>
+            <a:endParaRPr b="0" lang="en-GB" sz="4200" spc="-1" strike="noStrike">
+              <a:latin typeface="Arial"/>
+            </a:endParaRPr>
+          </a:p>
+        </p:txBody>
+      </p:sp>
+      <p:sp>
+        <p:nvSpPr>
+          <p:cNvPr id="47" name="Rectangle 16"/>
           <p:cNvSpPr/>
           <p:nvPr/>
         </p:nvSpPr>
         <p:spPr>
           <a:xfrm>
-            <a:off x="2160000" y="24799680"/>
-            <a:ext cx="14040000" cy="3930840"/>
-          </a:xfrm>
-          <a:prstGeom prst="rect">
-            <a:avLst/>
-          </a:prstGeom>
-          <a:noFill/>
-          <a:ln w="0">
-            <a:noFill/>
-          </a:ln>
-        </p:spPr>
-        <p:style>
-          <a:lnRef idx="0"/>
-          <a:fillRef idx="0"/>
-          <a:effectRef idx="0"/>
-          <a:fontRef idx="minor"/>
-        </p:style>
-        <p:txBody>
-          <a:bodyPr lIns="90000" rIns="90000" tIns="45000" bIns="45000" anchor="t">
-            <a:spAutoFit/>
-          </a:bodyPr>
-          <a:p>
-            <a:pPr>
-              <a:lnSpc>
-                <a:spcPct val="150000"/>
-              </a:lnSpc>
-              <a:buNone/>
-            </a:pPr>
-            <a:r>
-              <a:rPr b="1" lang="en-US" sz="4200" spc="-1" strike="noStrike">
-                <a:solidFill>
-                  <a:srgbClr val="000000"/>
-                </a:solidFill>
-                <a:latin typeface="Segoe UI Black"/>
-                <a:ea typeface="Segoe UI Black"/>
-              </a:rPr>
-              <a:t>Result 2:</a:t>
-            </a:r>
-            <a:r>
-              <a:rPr b="0" lang="en-US" sz="4200" spc="-1" strike="noStrike">
-                <a:solidFill>
-                  <a:srgbClr val="000000"/>
-                </a:solidFill>
-                <a:latin typeface="Segoe UI Black"/>
-                <a:ea typeface="Segoe UI Black"/>
-              </a:rPr>
-              <a:t> Field strength was revealed as only significant effect on brain age in FTHP1 in a random intercept model (</a:t>
-            </a:r>
-            <a:r>
-              <a:rPr b="0" i="1" lang="en-US" sz="4200" spc="-1" strike="noStrike">
-                <a:solidFill>
-                  <a:srgbClr val="000000"/>
-                </a:solidFill>
-                <a:latin typeface="Segoe UI Black"/>
-                <a:ea typeface="Segoe UI Black"/>
-              </a:rPr>
-              <a:t>β</a:t>
-            </a:r>
-            <a:r>
-              <a:rPr b="0" lang="en-US" sz="4200" spc="-1" strike="noStrike">
-                <a:solidFill>
-                  <a:srgbClr val="000000"/>
-                </a:solidFill>
-                <a:latin typeface="Segoe UI Black"/>
-                <a:ea typeface="Segoe UI Black"/>
-              </a:rPr>
-              <a:t> = -1.141, </a:t>
-            </a:r>
-            <a:r>
-              <a:rPr b="0" i="1" lang="en-US" sz="4200" spc="-1" strike="noStrike">
-                <a:solidFill>
-                  <a:srgbClr val="000000"/>
-                </a:solidFill>
-                <a:latin typeface="Segoe UI Black"/>
-                <a:ea typeface="Segoe UI Black"/>
-              </a:rPr>
-              <a:t>p</a:t>
-            </a:r>
-            <a:r>
-              <a:rPr b="0" lang="en-US" sz="4200" spc="-1" strike="noStrike" baseline="-8000">
-                <a:solidFill>
-                  <a:srgbClr val="000000"/>
-                </a:solidFill>
-                <a:latin typeface="Segoe UI"/>
-                <a:ea typeface="Segoe UI Black"/>
-              </a:rPr>
-              <a:t>Holm</a:t>
-            </a:r>
-            <a:r>
-              <a:rPr b="0" lang="en-US" sz="4200" spc="-1" strike="noStrike">
-                <a:solidFill>
-                  <a:srgbClr val="000000"/>
-                </a:solidFill>
-                <a:latin typeface="Segoe UI Black"/>
-                <a:ea typeface="Segoe UI Black"/>
-              </a:rPr>
-              <a:t> &lt; .001).</a:t>
-            </a:r>
-            <a:endParaRPr b="0" lang="en-GB" sz="4200" spc="-1" strike="noStrike">
-              <a:latin typeface="Arial"/>
-            </a:endParaRPr>
-          </a:p>
-          <a:p>
-            <a:pPr>
-              <a:lnSpc>
-                <a:spcPct val="150000"/>
-              </a:lnSpc>
-              <a:buNone/>
-            </a:pPr>
-            <a:endParaRPr b="0" lang="en-GB" sz="4200" spc="-1" strike="noStrike">
-              <a:latin typeface="Arial"/>
-            </a:endParaRPr>
-          </a:p>
-        </p:txBody>
-      </p:sp>
-      <p:pic>
-        <p:nvPicPr>
-          <p:cNvPr id="51" name="" descr=""/>
-          <p:cNvPicPr/>
-          <p:nvPr/>
-        </p:nvPicPr>
-        <p:blipFill>
-          <a:blip r:embed="rId1"/>
-          <a:stretch/>
-        </p:blipFill>
-        <p:spPr>
-          <a:xfrm>
-            <a:off x="4720320" y="38619360"/>
-            <a:ext cx="1079640" cy="1079640"/>
-          </a:xfrm>
-          <a:prstGeom prst="rect">
-            <a:avLst/>
-          </a:prstGeom>
-          <a:ln w="0">
-            <a:noFill/>
-          </a:ln>
-        </p:spPr>
-      </p:pic>
-      <p:pic>
-        <p:nvPicPr>
-          <p:cNvPr id="52" name="" descr=""/>
-          <p:cNvPicPr/>
-          <p:nvPr/>
-        </p:nvPicPr>
-        <p:blipFill>
-          <a:blip r:embed="rId2"/>
-          <a:stretch/>
-        </p:blipFill>
-        <p:spPr>
-          <a:xfrm>
-            <a:off x="360000" y="38619360"/>
-            <a:ext cx="3984480" cy="1153080"/>
-          </a:xfrm>
-          <a:prstGeom prst="rect">
-            <a:avLst/>
-          </a:prstGeom>
-          <a:ln w="0">
-            <a:noFill/>
-          </a:ln>
-        </p:spPr>
-      </p:pic>
-      <p:pic>
-        <p:nvPicPr>
-          <p:cNvPr id="53" name="" descr=""/>
-          <p:cNvPicPr/>
-          <p:nvPr/>
-        </p:nvPicPr>
-        <p:blipFill>
-          <a:blip r:embed="rId3"/>
-          <a:stretch/>
-        </p:blipFill>
-        <p:spPr>
-          <a:xfrm>
-            <a:off x="451080" y="40028040"/>
-            <a:ext cx="3688560" cy="938160"/>
-          </a:xfrm>
-          <a:prstGeom prst="rect">
-            <a:avLst/>
-          </a:prstGeom>
-          <a:ln w="0">
-            <a:noFill/>
-          </a:ln>
-        </p:spPr>
-      </p:pic>
-      <p:sp>
-        <p:nvSpPr>
-          <p:cNvPr id="54" name="TextBox 3"/>
-          <p:cNvSpPr/>
-          <p:nvPr/>
-        </p:nvSpPr>
-        <p:spPr>
-          <a:xfrm>
-            <a:off x="1882800" y="33848640"/>
-            <a:ext cx="28537200" cy="3745440"/>
-          </a:xfrm>
-          <a:prstGeom prst="rect">
-            <a:avLst/>
-          </a:prstGeom>
-          <a:solidFill>
-            <a:schemeClr val="bg1">
-              <a:lumMod val="95000"/>
-            </a:schemeClr>
-          </a:solidFill>
-          <a:ln w="0">
-            <a:noFill/>
-          </a:ln>
-        </p:spPr>
-        <p:style>
-          <a:lnRef idx="0"/>
-          <a:fillRef idx="0"/>
-          <a:effectRef idx="0"/>
-          <a:fontRef idx="minor"/>
-        </p:style>
-        <p:txBody>
-          <a:bodyPr lIns="432360" rIns="432360" tIns="432360" bIns="432360" anchor="t">
-            <a:spAutoFit/>
-          </a:bodyPr>
-          <a:p>
-            <a:pPr>
-              <a:lnSpc>
-                <a:spcPct val="150000"/>
-              </a:lnSpc>
-              <a:buNone/>
-            </a:pPr>
-            <a:r>
-              <a:rPr b="1" lang="en-US" sz="4200" spc="-1" strike="noStrike">
-                <a:solidFill>
-                  <a:srgbClr val="000000"/>
-                </a:solidFill>
-                <a:latin typeface="Segoe UI"/>
-                <a:ea typeface="Segoe UI Black"/>
-              </a:rPr>
-              <a:t>Conclusion:</a:t>
-            </a:r>
-            <a:r>
-              <a:rPr b="0" lang="en-US" sz="4200" spc="-1" strike="noStrike">
-                <a:solidFill>
-                  <a:srgbClr val="000000"/>
-                </a:solidFill>
-                <a:latin typeface="Segoe UI"/>
-                <a:ea typeface="Segoe UI Black"/>
-              </a:rPr>
-              <a:t> Brain age estimates are potentially influenced by acquisition </a:t>
-            </a:r>
-            <a:r>
-              <a:rPr b="0" lang="en-US" sz="4200" spc="-1" strike="noStrike">
-                <a:solidFill>
-                  <a:srgbClr val="000000"/>
-                </a:solidFill>
-                <a:latin typeface="Segoe UI"/>
-                <a:ea typeface="Segoe UI Black"/>
-              </a:rPr>
-              <a:t>parameters and scan quality. An avenue for future brain age modelling could be to employ multiple, more specific models, tuned to developmental and individual differences and acquision parameters. </a:t>
-            </a:r>
-            <a:endParaRPr b="0" lang="en-GB" sz="4200" spc="-1" strike="noStrike">
-              <a:latin typeface="Arial"/>
-            </a:endParaRPr>
-          </a:p>
-        </p:txBody>
-      </p:sp>
-      <p:sp>
-        <p:nvSpPr>
-          <p:cNvPr id="55" name=""/>
-          <p:cNvSpPr/>
-          <p:nvPr/>
-        </p:nvSpPr>
-        <p:spPr>
-          <a:xfrm>
-            <a:off x="27760320" y="40304880"/>
-            <a:ext cx="4511880" cy="1394640"/>
-          </a:xfrm>
-          <a:prstGeom prst="rect">
-            <a:avLst/>
-          </a:prstGeom>
-          <a:noFill/>
-          <a:ln w="0">
-            <a:noFill/>
-          </a:ln>
-        </p:spPr>
-        <p:style>
-          <a:lnRef idx="0"/>
-          <a:fillRef idx="0"/>
-          <a:effectRef idx="0"/>
-          <a:fontRef idx="minor"/>
-        </p:style>
-        <p:txBody>
-          <a:bodyPr lIns="90000" rIns="90000" tIns="45000" bIns="45000" anchor="t">
-            <a:noAutofit/>
-          </a:bodyPr>
-          <a:p>
-            <a:pPr>
-              <a:lnSpc>
-                <a:spcPct val="100000"/>
-              </a:lnSpc>
-              <a:buNone/>
-            </a:pPr>
-            <a:r>
-              <a:rPr b="0" lang="en-US" sz="4400" spc="-1" strike="noStrike">
-                <a:solidFill>
-                  <a:srgbClr val="ffffff"/>
-                </a:solidFill>
-                <a:latin typeface="Segoe UI Light"/>
-              </a:rPr>
-              <a:t>Preprint</a:t>
-            </a:r>
-            <a:endParaRPr b="0" lang="en-GB" sz="4400" spc="-1" strike="noStrike">
-              <a:latin typeface="Arial"/>
-            </a:endParaRPr>
-          </a:p>
-        </p:txBody>
-      </p:sp>
-      <p:pic>
-        <p:nvPicPr>
-          <p:cNvPr id="56" name="" descr=""/>
-          <p:cNvPicPr/>
-          <p:nvPr/>
-        </p:nvPicPr>
-        <p:blipFill>
-          <a:blip r:embed="rId4"/>
-          <a:stretch/>
-        </p:blipFill>
-        <p:spPr>
-          <a:xfrm>
-            <a:off x="27180000" y="36749520"/>
-            <a:ext cx="3600000" cy="3600000"/>
-          </a:xfrm>
-          <a:prstGeom prst="rect">
-            <a:avLst/>
-          </a:prstGeom>
-          <a:ln w="0">
-            <a:noFill/>
-          </a:ln>
-        </p:spPr>
-      </p:pic>
-      <p:pic>
-        <p:nvPicPr>
-          <p:cNvPr id="57" name="" descr=""/>
-          <p:cNvPicPr/>
-          <p:nvPr/>
-        </p:nvPicPr>
-        <p:blipFill>
-          <a:blip r:embed="rId5"/>
-          <a:stretch/>
-        </p:blipFill>
-        <p:spPr>
-          <a:xfrm>
-            <a:off x="11499840" y="16235640"/>
-            <a:ext cx="18360000" cy="7730280"/>
-          </a:xfrm>
-          <a:prstGeom prst="rect">
-            <a:avLst/>
-          </a:prstGeom>
-          <a:ln w="0">
-            <a:noFill/>
-          </a:ln>
-        </p:spPr>
-      </p:pic>
-      <p:pic>
-        <p:nvPicPr>
-          <p:cNvPr id="58" name="" descr=""/>
-          <p:cNvPicPr/>
-          <p:nvPr/>
-        </p:nvPicPr>
-        <p:blipFill>
-          <a:blip r:embed="rId6"/>
-          <a:stretch/>
-        </p:blipFill>
-        <p:spPr>
-          <a:xfrm>
-            <a:off x="3121920" y="27957960"/>
-            <a:ext cx="11968560" cy="5038920"/>
-          </a:xfrm>
-          <a:prstGeom prst="rect">
-            <a:avLst/>
-          </a:prstGeom>
-          <a:ln w="0">
-            <a:noFill/>
-          </a:ln>
-        </p:spPr>
-      </p:pic>
-      <p:sp>
-        <p:nvSpPr>
-          <p:cNvPr id="59" name="Rectangle 3"/>
-          <p:cNvSpPr/>
-          <p:nvPr/>
-        </p:nvSpPr>
-        <p:spPr>
-          <a:xfrm>
-            <a:off x="17017560" y="24621840"/>
-            <a:ext cx="13402440" cy="8460000"/>
+            <a:off x="1897560" y="16067520"/>
+            <a:ext cx="28522080" cy="7949520"/>
           </a:xfrm>
           <a:prstGeom prst="rect">
             <a:avLst/>
@@ -3796,14 +3127,733 @@
       </p:sp>
       <p:sp>
         <p:nvSpPr>
-          <p:cNvPr id="60" name="TextBox 4"/>
+          <p:cNvPr id="48" name="TextBox 31"/>
           <p:cNvSpPr/>
           <p:nvPr/>
         </p:nvSpPr>
         <p:spPr>
           <a:xfrm>
+            <a:off x="2138400" y="16286400"/>
+            <a:ext cx="8661240" cy="6810480"/>
+          </a:xfrm>
+          <a:prstGeom prst="rect">
+            <a:avLst/>
+          </a:prstGeom>
+          <a:noFill/>
+          <a:ln w="0">
+            <a:noFill/>
+          </a:ln>
+        </p:spPr>
+        <p:style>
+          <a:lnRef idx="0"/>
+          <a:fillRef idx="0"/>
+          <a:effectRef idx="0"/>
+          <a:fontRef idx="minor"/>
+        </p:style>
+        <p:txBody>
+          <a:bodyPr lIns="90000" rIns="90000" tIns="45000" bIns="45000" anchor="t">
+            <a:spAutoFit/>
+          </a:bodyPr>
+          <a:p>
+            <a:pPr>
+              <a:lnSpc>
+                <a:spcPct val="150000"/>
+              </a:lnSpc>
+              <a:buNone/>
+            </a:pPr>
+            <a:r>
+              <a:rPr b="1" lang="en-US" sz="4200" spc="-1" strike="noStrike">
+                <a:solidFill>
+                  <a:srgbClr val="000000"/>
+                </a:solidFill>
+                <a:latin typeface="Segoe UI Black"/>
+                <a:ea typeface="Segoe UI Black"/>
+              </a:rPr>
+              <a:t>Result 1:</a:t>
+            </a:r>
+            <a:r>
+              <a:rPr b="0" lang="en-US" sz="4200" spc="-1" strike="noStrike">
+                <a:solidFill>
+                  <a:srgbClr val="000000"/>
+                </a:solidFill>
+                <a:latin typeface="Segoe UI Black"/>
+                <a:ea typeface="Segoe UI Black"/>
+              </a:rPr>
+              <a:t> Crude within-subject correlations between age and brain age revealed differing directionalities of slopes across subjects, with the correlation being only statistically significant in FTHP1.</a:t>
+            </a:r>
+            <a:endParaRPr b="0" lang="en-GB" sz="4200" spc="-1" strike="noStrike">
+              <a:latin typeface="Arial"/>
+            </a:endParaRPr>
+          </a:p>
+        </p:txBody>
+      </p:sp>
+      <p:sp>
+        <p:nvSpPr>
+          <p:cNvPr id="49" name="TextBox 2"/>
+          <p:cNvSpPr/>
+          <p:nvPr/>
+        </p:nvSpPr>
+        <p:spPr>
+          <a:xfrm>
+            <a:off x="1882800" y="8767080"/>
+            <a:ext cx="28443600" cy="6625080"/>
+          </a:xfrm>
+          <a:prstGeom prst="rect">
+            <a:avLst/>
+          </a:prstGeom>
+          <a:solidFill>
+            <a:schemeClr val="bg1">
+              <a:lumMod val="95000"/>
+            </a:schemeClr>
+          </a:solidFill>
+          <a:ln w="0">
+            <a:noFill/>
+          </a:ln>
+        </p:spPr>
+        <p:style>
+          <a:lnRef idx="0"/>
+          <a:fillRef idx="0"/>
+          <a:effectRef idx="0"/>
+          <a:fontRef idx="minor"/>
+        </p:style>
+        <p:txBody>
+          <a:bodyPr lIns="432360" rIns="432360" tIns="432360" bIns="432360" anchor="t">
+            <a:spAutoFit/>
+          </a:bodyPr>
+          <a:p>
+            <a:pPr>
+              <a:lnSpc>
+                <a:spcPct val="150000"/>
+              </a:lnSpc>
+              <a:buNone/>
+            </a:pPr>
+            <a:r>
+              <a:rPr b="1" lang="en-US" sz="4200" spc="-1" strike="noStrike">
+                <a:solidFill>
+                  <a:srgbClr val="000000"/>
+                </a:solidFill>
+                <a:latin typeface="Segoe UI"/>
+                <a:ea typeface="Segoe UI Black"/>
+              </a:rPr>
+              <a:t>Background: </a:t>
+            </a:r>
+            <a:r>
+              <a:rPr b="0" lang="en-US" sz="4200" spc="-1" strike="noStrike">
+                <a:solidFill>
+                  <a:srgbClr val="000000"/>
+                </a:solidFill>
+                <a:latin typeface="Segoe UI"/>
+                <a:ea typeface="Segoe UI Black"/>
+              </a:rPr>
+              <a:t>Brain age is a promising biomarker of brain or general health. However, to extend the metric’s clinical applications, the large intra-individual varibility in age predictions needs adressing.</a:t>
+            </a:r>
+            <a:endParaRPr b="0" lang="en-GB" sz="4200" spc="-1" strike="noStrike">
+              <a:latin typeface="Arial"/>
+            </a:endParaRPr>
+          </a:p>
+          <a:p>
+            <a:pPr>
+              <a:lnSpc>
+                <a:spcPct val="150000"/>
+              </a:lnSpc>
+              <a:buNone/>
+            </a:pPr>
+            <a:r>
+              <a:rPr b="1" lang="en-US" sz="4200" spc="-1" strike="noStrike">
+                <a:solidFill>
+                  <a:srgbClr val="000000"/>
+                </a:solidFill>
+                <a:latin typeface="Segoe UI"/>
+                <a:ea typeface="Segoe UI Black"/>
+              </a:rPr>
+              <a:t>Method:</a:t>
+            </a:r>
+            <a:r>
+              <a:rPr b="0" lang="en-US" sz="4200" spc="-1" strike="noStrike">
+                <a:solidFill>
+                  <a:srgbClr val="000000"/>
+                </a:solidFill>
+                <a:latin typeface="Segoe UI"/>
+                <a:ea typeface="Segoe UI Black"/>
+              </a:rPr>
+              <a:t>  We used the pre-trained deep neural network </a:t>
+            </a:r>
+            <a:r>
+              <a:rPr b="0" i="1" lang="en-US" sz="4200" spc="-1" strike="noStrike">
+                <a:solidFill>
+                  <a:srgbClr val="000000"/>
+                </a:solidFill>
+                <a:latin typeface="Segoe UI"/>
+                <a:ea typeface="Segoe UI Black"/>
+              </a:rPr>
+              <a:t>pyment</a:t>
+            </a:r>
+            <a:r>
+              <a:rPr b="0" lang="en-US" sz="4200" spc="-1" strike="noStrike">
+                <a:solidFill>
+                  <a:srgbClr val="000000"/>
+                </a:solidFill>
+                <a:latin typeface="Segoe UI"/>
+                <a:ea typeface="Segoe UI Black"/>
+              </a:rPr>
+              <a:t> to predict brain ages from densly sampled T1-weighted magnetic resonance imaging data from three individuals (BBSC1-3) scanned in total N</a:t>
+            </a:r>
+            <a:r>
+              <a:rPr b="0" lang="en-US" sz="4200" spc="-1" strike="noStrike" baseline="-8000">
+                <a:solidFill>
+                  <a:srgbClr val="000000"/>
+                </a:solidFill>
+                <a:latin typeface="Segoe UI"/>
+                <a:ea typeface="Segoe UI Black"/>
+              </a:rPr>
+              <a:t>BBSC</a:t>
+            </a:r>
+            <a:r>
+              <a:rPr b="0" lang="en-US" sz="4200" spc="-1" strike="noStrike">
+                <a:solidFill>
+                  <a:srgbClr val="000000"/>
+                </a:solidFill>
+                <a:latin typeface="Segoe UI"/>
+                <a:ea typeface="Segoe UI Black"/>
+              </a:rPr>
+              <a:t> = 103 times over a one-year interval, and an independent data set including one individual (FTHP1) scanned N</a:t>
+            </a:r>
+            <a:r>
+              <a:rPr b="0" lang="en-US" sz="4200" spc="-1" strike="noStrike" baseline="-8000">
+                <a:solidFill>
+                  <a:srgbClr val="000000"/>
+                </a:solidFill>
+                <a:latin typeface="Segoe UI"/>
+                <a:ea typeface="Segoe UI Black"/>
+              </a:rPr>
+              <a:t>FTHP </a:t>
+            </a:r>
+            <a:r>
+              <a:rPr b="0" lang="en-US" sz="4200" spc="-1" strike="noStrike">
+                <a:solidFill>
+                  <a:srgbClr val="000000"/>
+                </a:solidFill>
+                <a:latin typeface="Segoe UI"/>
+                <a:ea typeface="Segoe UI Black"/>
+              </a:rPr>
+              <a:t>= 557 times over a three-year interval.</a:t>
+            </a:r>
+            <a:endParaRPr b="0" lang="en-GB" sz="4200" spc="-1" strike="noStrike">
+              <a:latin typeface="Arial"/>
+            </a:endParaRPr>
+          </a:p>
+        </p:txBody>
+      </p:sp>
+      <p:sp>
+        <p:nvSpPr>
+          <p:cNvPr id="50" name="TextBox 40"/>
+          <p:cNvSpPr/>
+          <p:nvPr/>
+        </p:nvSpPr>
+        <p:spPr>
+          <a:xfrm>
+            <a:off x="1839600" y="6276240"/>
+            <a:ext cx="29175120" cy="1991160"/>
+          </a:xfrm>
+          <a:prstGeom prst="rect">
+            <a:avLst/>
+          </a:prstGeom>
+          <a:noFill/>
+          <a:ln w="0">
+            <a:noFill/>
+          </a:ln>
+        </p:spPr>
+        <p:style>
+          <a:lnRef idx="0"/>
+          <a:fillRef idx="0"/>
+          <a:effectRef idx="0"/>
+          <a:fontRef idx="minor"/>
+        </p:style>
+        <p:txBody>
+          <a:bodyPr lIns="90000" rIns="90000" tIns="45000" bIns="45000" anchor="t">
+            <a:spAutoFit/>
+          </a:bodyPr>
+          <a:p>
+            <a:pPr>
+              <a:lnSpc>
+                <a:spcPct val="100000"/>
+              </a:lnSpc>
+              <a:buNone/>
+            </a:pPr>
+            <a:r>
+              <a:rPr b="0" i="1" lang="en-US" sz="6240" spc="-1" strike="noStrike">
+                <a:solidFill>
+                  <a:srgbClr val="262626"/>
+                </a:solidFill>
+                <a:latin typeface="Segoe UI"/>
+                <a:ea typeface="DejaVu Sans"/>
+              </a:rPr>
+              <a:t>Considerations on brain age predictions from repeatedly sampled data across time</a:t>
+            </a:r>
+            <a:endParaRPr b="0" lang="en-GB" sz="6240" spc="-1" strike="noStrike">
+              <a:latin typeface="Arial"/>
+            </a:endParaRPr>
+          </a:p>
+        </p:txBody>
+      </p:sp>
+      <p:sp>
+        <p:nvSpPr>
+          <p:cNvPr id="51" name="TextBox 1"/>
+          <p:cNvSpPr/>
+          <p:nvPr/>
+        </p:nvSpPr>
+        <p:spPr>
+          <a:xfrm>
+            <a:off x="2160000" y="24799680"/>
+            <a:ext cx="14039640" cy="3930120"/>
+          </a:xfrm>
+          <a:prstGeom prst="rect">
+            <a:avLst/>
+          </a:prstGeom>
+          <a:noFill/>
+          <a:ln w="0">
+            <a:noFill/>
+          </a:ln>
+        </p:spPr>
+        <p:style>
+          <a:lnRef idx="0"/>
+          <a:fillRef idx="0"/>
+          <a:effectRef idx="0"/>
+          <a:fontRef idx="minor"/>
+        </p:style>
+        <p:txBody>
+          <a:bodyPr lIns="90000" rIns="90000" tIns="45000" bIns="45000" anchor="t">
+            <a:spAutoFit/>
+          </a:bodyPr>
+          <a:p>
+            <a:pPr>
+              <a:lnSpc>
+                <a:spcPct val="150000"/>
+              </a:lnSpc>
+              <a:buNone/>
+            </a:pPr>
+            <a:r>
+              <a:rPr b="1" lang="en-US" sz="4200" spc="-1" strike="noStrike">
+                <a:solidFill>
+                  <a:srgbClr val="000000"/>
+                </a:solidFill>
+                <a:latin typeface="Segoe UI Black"/>
+                <a:ea typeface="Segoe UI Black"/>
+              </a:rPr>
+              <a:t>Result 2:</a:t>
+            </a:r>
+            <a:r>
+              <a:rPr b="0" lang="en-US" sz="4200" spc="-1" strike="noStrike">
+                <a:solidFill>
+                  <a:srgbClr val="000000"/>
+                </a:solidFill>
+                <a:latin typeface="Segoe UI Black"/>
+                <a:ea typeface="Segoe UI Black"/>
+              </a:rPr>
+              <a:t> Field strength was revealed as only significant effect on brain age in FTHP1 in a random intercept model (</a:t>
+            </a:r>
+            <a:r>
+              <a:rPr b="0" i="1" lang="en-US" sz="4200" spc="-1" strike="noStrike">
+                <a:solidFill>
+                  <a:srgbClr val="000000"/>
+                </a:solidFill>
+                <a:latin typeface="Segoe UI Black"/>
+                <a:ea typeface="Segoe UI Black"/>
+              </a:rPr>
+              <a:t>β</a:t>
+            </a:r>
+            <a:r>
+              <a:rPr b="0" lang="en-US" sz="4200" spc="-1" strike="noStrike">
+                <a:solidFill>
+                  <a:srgbClr val="000000"/>
+                </a:solidFill>
+                <a:latin typeface="Segoe UI Black"/>
+                <a:ea typeface="Segoe UI Black"/>
+              </a:rPr>
+              <a:t> = -1.141, </a:t>
+            </a:r>
+            <a:r>
+              <a:rPr b="0" i="1" lang="en-US" sz="4200" spc="-1" strike="noStrike">
+                <a:solidFill>
+                  <a:srgbClr val="000000"/>
+                </a:solidFill>
+                <a:latin typeface="Segoe UI Black"/>
+                <a:ea typeface="Segoe UI Black"/>
+              </a:rPr>
+              <a:t>p</a:t>
+            </a:r>
+            <a:r>
+              <a:rPr b="0" lang="en-US" sz="4200" spc="-1" strike="noStrike" baseline="-8000">
+                <a:solidFill>
+                  <a:srgbClr val="000000"/>
+                </a:solidFill>
+                <a:latin typeface="Segoe UI"/>
+                <a:ea typeface="Segoe UI Black"/>
+              </a:rPr>
+              <a:t>Holm</a:t>
+            </a:r>
+            <a:r>
+              <a:rPr b="0" lang="en-US" sz="4200" spc="-1" strike="noStrike">
+                <a:solidFill>
+                  <a:srgbClr val="000000"/>
+                </a:solidFill>
+                <a:latin typeface="Segoe UI Black"/>
+                <a:ea typeface="Segoe UI Black"/>
+              </a:rPr>
+              <a:t> &lt; .001).</a:t>
+            </a:r>
+            <a:endParaRPr b="0" lang="en-GB" sz="4200" spc="-1" strike="noStrike">
+              <a:latin typeface="Arial"/>
+            </a:endParaRPr>
+          </a:p>
+          <a:p>
+            <a:pPr>
+              <a:lnSpc>
+                <a:spcPct val="150000"/>
+              </a:lnSpc>
+              <a:buNone/>
+            </a:pPr>
+            <a:endParaRPr b="0" lang="en-GB" sz="4200" spc="-1" strike="noStrike">
+              <a:latin typeface="Arial"/>
+            </a:endParaRPr>
+          </a:p>
+        </p:txBody>
+      </p:sp>
+      <p:pic>
+        <p:nvPicPr>
+          <p:cNvPr id="52" name="" descr=""/>
+          <p:cNvPicPr/>
+          <p:nvPr/>
+        </p:nvPicPr>
+        <p:blipFill>
+          <a:blip r:embed="rId1"/>
+          <a:stretch/>
+        </p:blipFill>
+        <p:spPr>
+          <a:xfrm>
+            <a:off x="4669920" y="39248640"/>
+            <a:ext cx="1079280" cy="1079280"/>
+          </a:xfrm>
+          <a:prstGeom prst="rect">
+            <a:avLst/>
+          </a:prstGeom>
+          <a:ln w="0">
+            <a:noFill/>
+          </a:ln>
+        </p:spPr>
+      </p:pic>
+      <p:pic>
+        <p:nvPicPr>
+          <p:cNvPr id="53" name="" descr=""/>
+          <p:cNvPicPr/>
+          <p:nvPr/>
+        </p:nvPicPr>
+        <p:blipFill>
+          <a:blip r:embed="rId2"/>
+          <a:stretch/>
+        </p:blipFill>
+        <p:spPr>
+          <a:xfrm>
+            <a:off x="462600" y="38619360"/>
+            <a:ext cx="3984120" cy="1152720"/>
+          </a:xfrm>
+          <a:prstGeom prst="rect">
+            <a:avLst/>
+          </a:prstGeom>
+          <a:ln w="0">
+            <a:noFill/>
+          </a:ln>
+        </p:spPr>
+      </p:pic>
+      <p:pic>
+        <p:nvPicPr>
+          <p:cNvPr id="54" name="" descr=""/>
+          <p:cNvPicPr/>
+          <p:nvPr/>
+        </p:nvPicPr>
+        <p:blipFill>
+          <a:blip r:embed="rId3"/>
+          <a:stretch/>
+        </p:blipFill>
+        <p:spPr>
+          <a:xfrm>
+            <a:off x="451080" y="40028040"/>
+            <a:ext cx="3688200" cy="937800"/>
+          </a:xfrm>
+          <a:prstGeom prst="rect">
+            <a:avLst/>
+          </a:prstGeom>
+          <a:ln w="0">
+            <a:noFill/>
+          </a:ln>
+        </p:spPr>
+      </p:pic>
+      <p:sp>
+        <p:nvSpPr>
+          <p:cNvPr id="55" name="TextBox 3"/>
+          <p:cNvSpPr/>
+          <p:nvPr/>
+        </p:nvSpPr>
+        <p:spPr>
+          <a:xfrm>
+            <a:off x="1882800" y="33848640"/>
+            <a:ext cx="28536840" cy="3744720"/>
+          </a:xfrm>
+          <a:prstGeom prst="rect">
+            <a:avLst/>
+          </a:prstGeom>
+          <a:solidFill>
+            <a:schemeClr val="bg1">
+              <a:lumMod val="95000"/>
+            </a:schemeClr>
+          </a:solidFill>
+          <a:ln w="0">
+            <a:noFill/>
+          </a:ln>
+        </p:spPr>
+        <p:style>
+          <a:lnRef idx="0"/>
+          <a:fillRef idx="0"/>
+          <a:effectRef idx="0"/>
+          <a:fontRef idx="minor"/>
+        </p:style>
+        <p:txBody>
+          <a:bodyPr lIns="432360" rIns="432360" tIns="432360" bIns="432360" anchor="t">
+            <a:spAutoFit/>
+          </a:bodyPr>
+          <a:p>
+            <a:pPr>
+              <a:lnSpc>
+                <a:spcPct val="150000"/>
+              </a:lnSpc>
+              <a:buNone/>
+            </a:pPr>
+            <a:r>
+              <a:rPr b="1" lang="en-US" sz="4200" spc="-1" strike="noStrike">
+                <a:solidFill>
+                  <a:srgbClr val="000000"/>
+                </a:solidFill>
+                <a:latin typeface="Segoe UI"/>
+                <a:ea typeface="Segoe UI Black"/>
+              </a:rPr>
+              <a:t>Conclusion:</a:t>
+            </a:r>
+            <a:r>
+              <a:rPr b="0" lang="en-US" sz="4200" spc="-1" strike="noStrike">
+                <a:solidFill>
+                  <a:srgbClr val="000000"/>
+                </a:solidFill>
+                <a:latin typeface="Segoe UI"/>
+                <a:ea typeface="Segoe UI Black"/>
+              </a:rPr>
+              <a:t> Brain age estimates are potentially influenced by acquisition parameters and scan quality. An avenue for future brain age modelling could be to employ multiple, more specific models, tuned to developmental and individual differences and acquision parameters. </a:t>
+            </a:r>
+            <a:endParaRPr b="0" lang="en-GB" sz="4200" spc="-1" strike="noStrike">
+              <a:latin typeface="Arial"/>
+            </a:endParaRPr>
+          </a:p>
+        </p:txBody>
+      </p:sp>
+      <p:sp>
+        <p:nvSpPr>
+          <p:cNvPr id="56" name=""/>
+          <p:cNvSpPr/>
+          <p:nvPr/>
+        </p:nvSpPr>
+        <p:spPr>
+          <a:xfrm>
+            <a:off x="25084800" y="40409640"/>
+            <a:ext cx="7200000" cy="1635120"/>
+          </a:xfrm>
+          <a:prstGeom prst="rect">
+            <a:avLst/>
+          </a:prstGeom>
+          <a:noFill/>
+          <a:ln w="0">
+            <a:noFill/>
+          </a:ln>
+        </p:spPr>
+        <p:style>
+          <a:lnRef idx="0"/>
+          <a:fillRef idx="0"/>
+          <a:effectRef idx="0"/>
+          <a:fontRef idx="minor"/>
+        </p:style>
+        <p:txBody>
+          <a:bodyPr lIns="90000" rIns="90000" tIns="45000" bIns="45000" anchor="t">
+            <a:noAutofit/>
+          </a:bodyPr>
+          <a:p>
+            <a:pPr>
+              <a:lnSpc>
+                <a:spcPct val="100000"/>
+              </a:lnSpc>
+              <a:buNone/>
+            </a:pPr>
+            <a:r>
+              <a:rPr b="0" lang="en-US" sz="3600" spc="-1" strike="noStrike">
+                <a:solidFill>
+                  <a:srgbClr val="ffffff"/>
+                </a:solidFill>
+                <a:latin typeface="Segoe UI Light"/>
+                <a:ea typeface="DejaVu Sans"/>
+              </a:rPr>
+              <a:t>For more info see the preprint</a:t>
+            </a:r>
+            <a:endParaRPr b="0" lang="en-GB" sz="3600" spc="-1" strike="noStrike">
+              <a:latin typeface="Arial"/>
+            </a:endParaRPr>
+          </a:p>
+        </p:txBody>
+      </p:sp>
+      <p:pic>
+        <p:nvPicPr>
+          <p:cNvPr id="57" name="" descr=""/>
+          <p:cNvPicPr/>
+          <p:nvPr/>
+        </p:nvPicPr>
+        <p:blipFill>
+          <a:blip r:embed="rId4"/>
+          <a:stretch/>
+        </p:blipFill>
+        <p:spPr>
+          <a:xfrm>
+            <a:off x="27180000" y="36787680"/>
+            <a:ext cx="3599640" cy="3599640"/>
+          </a:xfrm>
+          <a:prstGeom prst="rect">
+            <a:avLst/>
+          </a:prstGeom>
+          <a:ln w="0">
+            <a:noFill/>
+          </a:ln>
+        </p:spPr>
+      </p:pic>
+      <p:pic>
+        <p:nvPicPr>
+          <p:cNvPr id="58" name="" descr=""/>
+          <p:cNvPicPr/>
+          <p:nvPr/>
+        </p:nvPicPr>
+        <p:blipFill>
+          <a:blip r:embed="rId5"/>
+          <a:stretch/>
+        </p:blipFill>
+        <p:spPr>
+          <a:xfrm>
+            <a:off x="11499840" y="16235640"/>
+            <a:ext cx="18359640" cy="7729920"/>
+          </a:xfrm>
+          <a:prstGeom prst="rect">
+            <a:avLst/>
+          </a:prstGeom>
+          <a:ln w="0">
+            <a:noFill/>
+          </a:ln>
+        </p:spPr>
+      </p:pic>
+      <p:pic>
+        <p:nvPicPr>
+          <p:cNvPr id="59" name="" descr=""/>
+          <p:cNvPicPr/>
+          <p:nvPr/>
+        </p:nvPicPr>
+        <p:blipFill>
+          <a:blip r:embed="rId6"/>
+          <a:stretch/>
+        </p:blipFill>
+        <p:spPr>
+          <a:xfrm>
+            <a:off x="3121920" y="27957960"/>
+            <a:ext cx="11968200" cy="5038560"/>
+          </a:xfrm>
+          <a:prstGeom prst="rect">
+            <a:avLst/>
+          </a:prstGeom>
+          <a:ln w="0">
+            <a:noFill/>
+          </a:ln>
+        </p:spPr>
+      </p:pic>
+      <p:sp>
+        <p:nvSpPr>
+          <p:cNvPr id="60" name="Rectangle 3"/>
+          <p:cNvSpPr/>
+          <p:nvPr/>
+        </p:nvSpPr>
+        <p:spPr>
+          <a:xfrm>
+            <a:off x="17017560" y="24621840"/>
+            <a:ext cx="13402080" cy="8459640"/>
+          </a:xfrm>
+          <a:prstGeom prst="rect">
+            <a:avLst/>
+          </a:prstGeom>
+          <a:solidFill>
+            <a:schemeClr val="bg1"/>
+          </a:solidFill>
+          <a:ln>
+            <a:noFill/>
+          </a:ln>
+          <a:effectLst>
+            <a:outerShdw algn="tl" blurRad="723960" dir="2700000" dist="114042" rotWithShape="0">
+              <a:srgbClr val="000000">
+                <a:alpha val="10000"/>
+              </a:srgbClr>
+            </a:outerShdw>
+          </a:effectLst>
+        </p:spPr>
+        <p:style>
+          <a:lnRef idx="2">
+            <a:schemeClr val="accent1">
+              <a:shade val="50000"/>
+            </a:schemeClr>
+          </a:lnRef>
+          <a:fillRef idx="1">
+            <a:schemeClr val="accent1"/>
+          </a:fillRef>
+          <a:effectRef idx="0">
+            <a:schemeClr val="accent1"/>
+          </a:effectRef>
+          <a:fontRef idx="minor"/>
+        </p:style>
+        <p:txBody>
+          <a:bodyPr lIns="90000" rIns="90000" tIns="45000" bIns="45000" anchor="ctr">
+            <a:noAutofit/>
+          </a:bodyPr>
+          <a:p>
+            <a:pPr algn="ctr">
+              <a:lnSpc>
+                <a:spcPct val="100000"/>
+              </a:lnSpc>
+              <a:buNone/>
+            </a:pPr>
+            <a:r>
+              <a:rPr b="0" lang="en-US" sz="1700" spc="-1" strike="noStrike">
+                <a:solidFill>
+                  <a:srgbClr val="ffffff"/>
+                </a:solidFill>
+                <a:latin typeface="Calibri"/>
+                <a:ea typeface="DejaVu Sans"/>
+              </a:rPr>
+              <a:t>v</a:t>
+            </a:r>
+            <a:endParaRPr b="0" lang="en-GB" sz="1700" spc="-1" strike="noStrike">
+              <a:latin typeface="Arial"/>
+            </a:endParaRPr>
+          </a:p>
+        </p:txBody>
+      </p:sp>
+      <p:sp>
+        <p:nvSpPr>
+          <p:cNvPr id="61" name="TextBox 4"/>
+          <p:cNvSpPr/>
+          <p:nvPr/>
+        </p:nvSpPr>
+        <p:spPr>
+          <a:xfrm>
             <a:off x="17280000" y="24850440"/>
-            <a:ext cx="12780000" cy="7770600"/>
+            <a:ext cx="12779640" cy="7770600"/>
           </a:xfrm>
           <a:prstGeom prst="rect">
             <a:avLst/>

</xml_diff>